<commit_message>
Added cpp hello world and cpp background presentation
</commit_message>
<xml_diff>
--- a/Classes/Class_1/Course_Syllabus.pptx
+++ b/Classes/Class_1/Course_Syllabus.pptx
@@ -28160,7 +28160,7 @@
           <a:p>
             <a:fld id="{DB430043-EE85-4B6C-A802-3E6B16F216A2}" type="datetimeFigureOut">
               <a:rPr lang="en-IL" smtClean="0"/>
-              <a:t>16/10/2022</a:t>
+              <a:t>17/10/2022</a:t>
             </a:fld>
             <a:endParaRPr lang="en-IL"/>
           </a:p>
@@ -28425,7 +28425,7 @@
           <a:p>
             <a:fld id="{6B548E75-1D94-41E4-8CAC-9631837BFE23}" type="datetimeFigureOut">
               <a:rPr lang="en-IL" smtClean="0"/>
-              <a:t>16/10/2022</a:t>
+              <a:t>17/10/2022</a:t>
             </a:fld>
             <a:endParaRPr lang="en-IL"/>
           </a:p>
@@ -28692,7 +28692,7 @@
           <a:p>
             <a:fld id="{6B548E75-1D94-41E4-8CAC-9631837BFE23}" type="datetimeFigureOut">
               <a:rPr lang="en-IL" smtClean="0"/>
-              <a:t>16/10/2022</a:t>
+              <a:t>17/10/2022</a:t>
             </a:fld>
             <a:endParaRPr lang="en-IL"/>
           </a:p>
@@ -28923,7 +28923,7 @@
           <a:p>
             <a:fld id="{6B548E75-1D94-41E4-8CAC-9631837BFE23}" type="datetimeFigureOut">
               <a:rPr lang="en-IL" smtClean="0"/>
-              <a:t>16/10/2022</a:t>
+              <a:t>17/10/2022</a:t>
             </a:fld>
             <a:endParaRPr lang="en-IL"/>
           </a:p>
@@ -29233,7 +29233,7 @@
           <a:p>
             <a:fld id="{6B548E75-1D94-41E4-8CAC-9631837BFE23}" type="datetimeFigureOut">
               <a:rPr lang="en-IL" smtClean="0"/>
-              <a:t>16/10/2022</a:t>
+              <a:t>17/10/2022</a:t>
             </a:fld>
             <a:endParaRPr lang="en-IL"/>
           </a:p>
@@ -29706,7 +29706,7 @@
           <a:p>
             <a:fld id="{6B548E75-1D94-41E4-8CAC-9631837BFE23}" type="datetimeFigureOut">
               <a:rPr lang="en-IL" smtClean="0"/>
-              <a:t>16/10/2022</a:t>
+              <a:t>17/10/2022</a:t>
             </a:fld>
             <a:endParaRPr lang="en-IL"/>
           </a:p>
@@ -30253,7 +30253,7 @@
           <a:p>
             <a:fld id="{6B548E75-1D94-41E4-8CAC-9631837BFE23}" type="datetimeFigureOut">
               <a:rPr lang="en-IL" smtClean="0"/>
-              <a:t>16/10/2022</a:t>
+              <a:t>17/10/2022</a:t>
             </a:fld>
             <a:endParaRPr lang="en-IL"/>
           </a:p>
@@ -31027,7 +31027,7 @@
           <a:p>
             <a:fld id="{6B548E75-1D94-41E4-8CAC-9631837BFE23}" type="datetimeFigureOut">
               <a:rPr lang="en-IL" smtClean="0"/>
-              <a:t>16/10/2022</a:t>
+              <a:t>17/10/2022</a:t>
             </a:fld>
             <a:endParaRPr lang="en-IL"/>
           </a:p>
@@ -31202,7 +31202,7 @@
           <a:p>
             <a:fld id="{6B548E75-1D94-41E4-8CAC-9631837BFE23}" type="datetimeFigureOut">
               <a:rPr lang="en-IL" smtClean="0"/>
-              <a:t>16/10/2022</a:t>
+              <a:t>17/10/2022</a:t>
             </a:fld>
             <a:endParaRPr lang="en-IL"/>
           </a:p>
@@ -31425,7 +31425,7 @@
           <a:p>
             <a:fld id="{6B548E75-1D94-41E4-8CAC-9631837BFE23}" type="datetimeFigureOut">
               <a:rPr lang="en-IL" smtClean="0"/>
-              <a:t>16/10/2022</a:t>
+              <a:t>17/10/2022</a:t>
             </a:fld>
             <a:endParaRPr lang="en-IL"/>
           </a:p>
@@ -31605,7 +31605,7 @@
           <a:p>
             <a:fld id="{6B548E75-1D94-41E4-8CAC-9631837BFE23}" type="datetimeFigureOut">
               <a:rPr lang="en-IL" smtClean="0"/>
-              <a:t>16/10/2022</a:t>
+              <a:t>17/10/2022</a:t>
             </a:fld>
             <a:endParaRPr lang="en-IL"/>
           </a:p>
@@ -31894,7 +31894,7 @@
           <a:p>
             <a:fld id="{6B548E75-1D94-41E4-8CAC-9631837BFE23}" type="datetimeFigureOut">
               <a:rPr lang="en-IL" smtClean="0"/>
-              <a:t>16/10/2022</a:t>
+              <a:t>17/10/2022</a:t>
             </a:fld>
             <a:endParaRPr lang="en-IL"/>
           </a:p>
@@ -32136,7 +32136,7 @@
           <a:p>
             <a:fld id="{6B548E75-1D94-41E4-8CAC-9631837BFE23}" type="datetimeFigureOut">
               <a:rPr lang="en-IL" smtClean="0"/>
-              <a:t>16/10/2022</a:t>
+              <a:t>17/10/2022</a:t>
             </a:fld>
             <a:endParaRPr lang="en-IL"/>
           </a:p>
@@ -32515,7 +32515,7 @@
           <a:p>
             <a:fld id="{6B548E75-1D94-41E4-8CAC-9631837BFE23}" type="datetimeFigureOut">
               <a:rPr lang="en-IL" smtClean="0"/>
-              <a:t>16/10/2022</a:t>
+              <a:t>17/10/2022</a:t>
             </a:fld>
             <a:endParaRPr lang="en-IL"/>
           </a:p>
@@ -32633,7 +32633,7 @@
           <a:p>
             <a:fld id="{6B548E75-1D94-41E4-8CAC-9631837BFE23}" type="datetimeFigureOut">
               <a:rPr lang="en-IL" smtClean="0"/>
-              <a:t>16/10/2022</a:t>
+              <a:t>17/10/2022</a:t>
             </a:fld>
             <a:endParaRPr lang="en-IL"/>
           </a:p>
@@ -32728,7 +32728,7 @@
           <a:p>
             <a:fld id="{6B548E75-1D94-41E4-8CAC-9631837BFE23}" type="datetimeFigureOut">
               <a:rPr lang="en-IL" smtClean="0"/>
-              <a:t>16/10/2022</a:t>
+              <a:t>17/10/2022</a:t>
             </a:fld>
             <a:endParaRPr lang="en-IL"/>
           </a:p>
@@ -32977,7 +32977,7 @@
           <a:p>
             <a:fld id="{6B548E75-1D94-41E4-8CAC-9631837BFE23}" type="datetimeFigureOut">
               <a:rPr lang="en-IL" smtClean="0"/>
-              <a:t>16/10/2022</a:t>
+              <a:t>17/10/2022</a:t>
             </a:fld>
             <a:endParaRPr lang="en-IL"/>
           </a:p>
@@ -33234,7 +33234,7 @@
           <a:p>
             <a:fld id="{6B548E75-1D94-41E4-8CAC-9631837BFE23}" type="datetimeFigureOut">
               <a:rPr lang="en-IL" smtClean="0"/>
-              <a:t>16/10/2022</a:t>
+              <a:t>17/10/2022</a:t>
             </a:fld>
             <a:endParaRPr lang="en-IL"/>
           </a:p>
@@ -33496,7 +33496,7 @@
           <a:p>
             <a:fld id="{6B548E75-1D94-41E4-8CAC-9631837BFE23}" type="datetimeFigureOut">
               <a:rPr lang="en-IL" smtClean="0"/>
-              <a:t>16/10/2022</a:t>
+              <a:t>17/10/2022</a:t>
             </a:fld>
             <a:endParaRPr lang="en-IL"/>
           </a:p>
@@ -34794,7 +34794,7 @@
             <p:ph idx="1"/>
             <p:extLst>
               <p:ext uri="{D42A27DB-BD31-4B8C-83A1-F6EECF244321}">
-                <p14:modId xmlns:p14="http://schemas.microsoft.com/office/powerpoint/2010/main" val="772212413"/>
+                <p14:modId xmlns:p14="http://schemas.microsoft.com/office/powerpoint/2010/main" val="2601852493"/>
               </p:ext>
             </p:extLst>
           </p:nvPr>
@@ -34810,14 +34810,14 @@
                 <a:tableStyleId>{5C22544A-7EE6-4342-B048-85BDC9FD1C3A}</a:tableStyleId>
               </a:tblPr>
               <a:tblGrid>
-                <a:gridCol w="3044488">
+                <a:gridCol w="1101470">
                   <a:extLst>
                     <a:ext uri="{9D8B030D-6E8A-4147-A177-3AD203B41FA5}">
                       <a16:colId xmlns:a16="http://schemas.microsoft.com/office/drawing/2014/main" val="788676069"/>
                     </a:ext>
                   </a:extLst>
                 </a:gridCol>
-                <a:gridCol w="3044488">
+                <a:gridCol w="4987506">
                   <a:extLst>
                     <a:ext uri="{9D8B030D-6E8A-4147-A177-3AD203B41FA5}">
                       <a16:colId xmlns:a16="http://schemas.microsoft.com/office/drawing/2014/main" val="270803823"/>

</xml_diff>

<commit_message>
Changed location for hello world project, updated gitignore and HW for class 1
</commit_message>
<xml_diff>
--- a/Classes/Class_1/Course_Syllabus.pptx
+++ b/Classes/Class_1/Course_Syllabus.pptx
@@ -28160,7 +28160,7 @@
           <a:p>
             <a:fld id="{DB430043-EE85-4B6C-A802-3E6B16F216A2}" type="datetimeFigureOut">
               <a:rPr lang="en-IL" smtClean="0"/>
-              <a:t>17/10/2022</a:t>
+              <a:t>21/10/2022</a:t>
             </a:fld>
             <a:endParaRPr lang="en-IL"/>
           </a:p>
@@ -28425,7 +28425,7 @@
           <a:p>
             <a:fld id="{6B548E75-1D94-41E4-8CAC-9631837BFE23}" type="datetimeFigureOut">
               <a:rPr lang="en-IL" smtClean="0"/>
-              <a:t>17/10/2022</a:t>
+              <a:t>21/10/2022</a:t>
             </a:fld>
             <a:endParaRPr lang="en-IL"/>
           </a:p>
@@ -28692,7 +28692,7 @@
           <a:p>
             <a:fld id="{6B548E75-1D94-41E4-8CAC-9631837BFE23}" type="datetimeFigureOut">
               <a:rPr lang="en-IL" smtClean="0"/>
-              <a:t>17/10/2022</a:t>
+              <a:t>21/10/2022</a:t>
             </a:fld>
             <a:endParaRPr lang="en-IL"/>
           </a:p>
@@ -28923,7 +28923,7 @@
           <a:p>
             <a:fld id="{6B548E75-1D94-41E4-8CAC-9631837BFE23}" type="datetimeFigureOut">
               <a:rPr lang="en-IL" smtClean="0"/>
-              <a:t>17/10/2022</a:t>
+              <a:t>21/10/2022</a:t>
             </a:fld>
             <a:endParaRPr lang="en-IL"/>
           </a:p>
@@ -29233,7 +29233,7 @@
           <a:p>
             <a:fld id="{6B548E75-1D94-41E4-8CAC-9631837BFE23}" type="datetimeFigureOut">
               <a:rPr lang="en-IL" smtClean="0"/>
-              <a:t>17/10/2022</a:t>
+              <a:t>21/10/2022</a:t>
             </a:fld>
             <a:endParaRPr lang="en-IL"/>
           </a:p>
@@ -29706,7 +29706,7 @@
           <a:p>
             <a:fld id="{6B548E75-1D94-41E4-8CAC-9631837BFE23}" type="datetimeFigureOut">
               <a:rPr lang="en-IL" smtClean="0"/>
-              <a:t>17/10/2022</a:t>
+              <a:t>21/10/2022</a:t>
             </a:fld>
             <a:endParaRPr lang="en-IL"/>
           </a:p>
@@ -30253,7 +30253,7 @@
           <a:p>
             <a:fld id="{6B548E75-1D94-41E4-8CAC-9631837BFE23}" type="datetimeFigureOut">
               <a:rPr lang="en-IL" smtClean="0"/>
-              <a:t>17/10/2022</a:t>
+              <a:t>21/10/2022</a:t>
             </a:fld>
             <a:endParaRPr lang="en-IL"/>
           </a:p>
@@ -31027,7 +31027,7 @@
           <a:p>
             <a:fld id="{6B548E75-1D94-41E4-8CAC-9631837BFE23}" type="datetimeFigureOut">
               <a:rPr lang="en-IL" smtClean="0"/>
-              <a:t>17/10/2022</a:t>
+              <a:t>21/10/2022</a:t>
             </a:fld>
             <a:endParaRPr lang="en-IL"/>
           </a:p>
@@ -31202,7 +31202,7 @@
           <a:p>
             <a:fld id="{6B548E75-1D94-41E4-8CAC-9631837BFE23}" type="datetimeFigureOut">
               <a:rPr lang="en-IL" smtClean="0"/>
-              <a:t>17/10/2022</a:t>
+              <a:t>21/10/2022</a:t>
             </a:fld>
             <a:endParaRPr lang="en-IL"/>
           </a:p>
@@ -31425,7 +31425,7 @@
           <a:p>
             <a:fld id="{6B548E75-1D94-41E4-8CAC-9631837BFE23}" type="datetimeFigureOut">
               <a:rPr lang="en-IL" smtClean="0"/>
-              <a:t>17/10/2022</a:t>
+              <a:t>21/10/2022</a:t>
             </a:fld>
             <a:endParaRPr lang="en-IL"/>
           </a:p>
@@ -31605,7 +31605,7 @@
           <a:p>
             <a:fld id="{6B548E75-1D94-41E4-8CAC-9631837BFE23}" type="datetimeFigureOut">
               <a:rPr lang="en-IL" smtClean="0"/>
-              <a:t>17/10/2022</a:t>
+              <a:t>21/10/2022</a:t>
             </a:fld>
             <a:endParaRPr lang="en-IL"/>
           </a:p>
@@ -31894,7 +31894,7 @@
           <a:p>
             <a:fld id="{6B548E75-1D94-41E4-8CAC-9631837BFE23}" type="datetimeFigureOut">
               <a:rPr lang="en-IL" smtClean="0"/>
-              <a:t>17/10/2022</a:t>
+              <a:t>21/10/2022</a:t>
             </a:fld>
             <a:endParaRPr lang="en-IL"/>
           </a:p>
@@ -32136,7 +32136,7 @@
           <a:p>
             <a:fld id="{6B548E75-1D94-41E4-8CAC-9631837BFE23}" type="datetimeFigureOut">
               <a:rPr lang="en-IL" smtClean="0"/>
-              <a:t>17/10/2022</a:t>
+              <a:t>21/10/2022</a:t>
             </a:fld>
             <a:endParaRPr lang="en-IL"/>
           </a:p>
@@ -32515,7 +32515,7 @@
           <a:p>
             <a:fld id="{6B548E75-1D94-41E4-8CAC-9631837BFE23}" type="datetimeFigureOut">
               <a:rPr lang="en-IL" smtClean="0"/>
-              <a:t>17/10/2022</a:t>
+              <a:t>21/10/2022</a:t>
             </a:fld>
             <a:endParaRPr lang="en-IL"/>
           </a:p>
@@ -32633,7 +32633,7 @@
           <a:p>
             <a:fld id="{6B548E75-1D94-41E4-8CAC-9631837BFE23}" type="datetimeFigureOut">
               <a:rPr lang="en-IL" smtClean="0"/>
-              <a:t>17/10/2022</a:t>
+              <a:t>21/10/2022</a:t>
             </a:fld>
             <a:endParaRPr lang="en-IL"/>
           </a:p>
@@ -32728,7 +32728,7 @@
           <a:p>
             <a:fld id="{6B548E75-1D94-41E4-8CAC-9631837BFE23}" type="datetimeFigureOut">
               <a:rPr lang="en-IL" smtClean="0"/>
-              <a:t>17/10/2022</a:t>
+              <a:t>21/10/2022</a:t>
             </a:fld>
             <a:endParaRPr lang="en-IL"/>
           </a:p>
@@ -32977,7 +32977,7 @@
           <a:p>
             <a:fld id="{6B548E75-1D94-41E4-8CAC-9631837BFE23}" type="datetimeFigureOut">
               <a:rPr lang="en-IL" smtClean="0"/>
-              <a:t>17/10/2022</a:t>
+              <a:t>21/10/2022</a:t>
             </a:fld>
             <a:endParaRPr lang="en-IL"/>
           </a:p>
@@ -33234,7 +33234,7 @@
           <a:p>
             <a:fld id="{6B548E75-1D94-41E4-8CAC-9631837BFE23}" type="datetimeFigureOut">
               <a:rPr lang="en-IL" smtClean="0"/>
-              <a:t>17/10/2022</a:t>
+              <a:t>21/10/2022</a:t>
             </a:fld>
             <a:endParaRPr lang="en-IL"/>
           </a:p>
@@ -33496,7 +33496,7 @@
           <a:p>
             <a:fld id="{6B548E75-1D94-41E4-8CAC-9631837BFE23}" type="datetimeFigureOut">
               <a:rPr lang="en-IL" smtClean="0"/>
-              <a:t>17/10/2022</a:t>
+              <a:t>21/10/2022</a:t>
             </a:fld>
             <a:endParaRPr lang="en-IL"/>
           </a:p>
@@ -35405,7 +35405,7 @@
             <p:ph idx="1"/>
             <p:extLst>
               <p:ext uri="{D42A27DB-BD31-4B8C-83A1-F6EECF244321}">
-                <p14:modId xmlns:p14="http://schemas.microsoft.com/office/powerpoint/2010/main" val="3964093797"/>
+                <p14:modId xmlns:p14="http://schemas.microsoft.com/office/powerpoint/2010/main" val="699930850"/>
               </p:ext>
             </p:extLst>
           </p:nvPr>
@@ -35741,7 +35741,7 @@
             <p:ph idx="1"/>
             <p:extLst>
               <p:ext uri="{D42A27DB-BD31-4B8C-83A1-F6EECF244321}">
-                <p14:modId xmlns:p14="http://schemas.microsoft.com/office/powerpoint/2010/main" val="1386145799"/>
+                <p14:modId xmlns:p14="http://schemas.microsoft.com/office/powerpoint/2010/main" val="3136292293"/>
               </p:ext>
             </p:extLst>
           </p:nvPr>
@@ -35949,9 +35949,49 @@
                     <a:p>
                       <a:r>
                         <a:rPr lang="en-US" sz="1500" dirty="0"/>
-                        <a:t>Finish FPS Game: VFX, Animation and Audio.</a:t>
+                        <a:t>Finish FPS Game: </a:t>
                       </a:r>
-                      <a:endParaRPr lang="en-IL" sz="1500" dirty="0"/>
+                      <a:r>
+                        <a:rPr lang="en-US" sz="1500" kern="1200" dirty="0">
+                          <a:solidFill>
+                            <a:schemeClr val="dk1"/>
+                          </a:solidFill>
+                          <a:latin typeface="+mn-lt"/>
+                          <a:ea typeface="+mn-ea"/>
+                          <a:cs typeface="+mn-cs"/>
+                        </a:rPr>
+                        <a:t>calling elements from </a:t>
+                      </a:r>
+                      <a:r>
+                        <a:rPr lang="en-US" sz="1500" kern="1200" dirty="0" err="1">
+                          <a:solidFill>
+                            <a:schemeClr val="dk1"/>
+                          </a:solidFill>
+                          <a:latin typeface="+mn-lt"/>
+                          <a:ea typeface="+mn-ea"/>
+                          <a:cs typeface="+mn-cs"/>
+                        </a:rPr>
+                        <a:t>cpp</a:t>
+                      </a:r>
+                      <a:r>
+                        <a:rPr lang="en-US" sz="1500" kern="1200" dirty="0">
+                          <a:solidFill>
+                            <a:schemeClr val="dk1"/>
+                          </a:solidFill>
+                          <a:latin typeface="+mn-lt"/>
+                          <a:ea typeface="+mn-ea"/>
+                          <a:cs typeface="+mn-cs"/>
+                        </a:rPr>
+                        <a:t> -  VFX, Animation and Audio.</a:t>
+                      </a:r>
+                      <a:endParaRPr lang="en-IL" sz="1500" kern="1200" dirty="0">
+                        <a:solidFill>
+                          <a:schemeClr val="dk1"/>
+                        </a:solidFill>
+                        <a:latin typeface="+mn-lt"/>
+                        <a:ea typeface="+mn-ea"/>
+                        <a:cs typeface="+mn-cs"/>
+                      </a:endParaRPr>
                     </a:p>
                   </a:txBody>
                   <a:tcPr marL="75165" marR="75165" marT="37582" marB="37582"/>
@@ -36064,14 +36104,14 @@
             <p:ph idx="1"/>
             <p:extLst>
               <p:ext uri="{D42A27DB-BD31-4B8C-83A1-F6EECF244321}">
-                <p14:modId xmlns:p14="http://schemas.microsoft.com/office/powerpoint/2010/main" val="729765828"/>
+                <p14:modId xmlns:p14="http://schemas.microsoft.com/office/powerpoint/2010/main" val="1866586846"/>
               </p:ext>
             </p:extLst>
           </p:nvPr>
         </p:nvGraphicFramePr>
         <p:xfrm>
           <a:off x="1261484" y="1975655"/>
-          <a:ext cx="9895464" cy="4039446"/>
+          <a:ext cx="9895464" cy="4268046"/>
         </p:xfrm>
         <a:graphic>
           <a:graphicData uri="http://schemas.openxmlformats.org/drawingml/2006/table">
@@ -36341,6 +36381,12 @@
                       <a:r>
                         <a:rPr lang="en-US" sz="1500" dirty="0"/>
                         <a:t>Bonus content.</a:t>
+                      </a:r>
+                    </a:p>
+                    <a:p>
+                      <a:r>
+                        <a:rPr lang="en-US" sz="1500"/>
+                        <a:t>Completing gaps</a:t>
                       </a:r>
                       <a:endParaRPr lang="en-IL" sz="1500" dirty="0"/>
                     </a:p>

</xml_diff>

<commit_message>
Added power points for class 2
</commit_message>
<xml_diff>
--- a/Classes/Class_1/Course_Syllabus.pptx
+++ b/Classes/Class_1/Course_Syllabus.pptx
@@ -8963,7 +8963,7 @@
         <a:lstStyle/>
         <a:p>
           <a:r>
-            <a:rPr lang="en-US"/>
+            <a:rPr lang="en-US" dirty="0"/>
             <a:t>Classes and Structs</a:t>
           </a:r>
         </a:p>
@@ -9504,7 +9504,7 @@
         <a:p>
           <a:r>
             <a:rPr lang="en-US" dirty="0"/>
-            <a:t>Const &amp; Static</a:t>
+            <a:t>Const</a:t>
           </a:r>
         </a:p>
       </dgm:t>
@@ -9536,28 +9536,6 @@
       <dgm:spPr/>
     </dgm:pt>
     <dgm:pt modelId="{495E6296-CF2C-4F4A-AF30-51FC7711B2D1}" type="sibTrans" cxnId="{0F7E46E1-C813-4DB6-9E59-BCACB6A6B9FB}">
-      <dgm:prSet/>
-      <dgm:spPr/>
-    </dgm:pt>
-    <dgm:pt modelId="{CA10B913-777F-4754-BD2F-1112C8B7A543}">
-      <dgm:prSet/>
-      <dgm:spPr/>
-      <dgm:t>
-        <a:bodyPr/>
-        <a:lstStyle/>
-        <a:p>
-          <a:r>
-            <a:rPr lang="en-US" dirty="0"/>
-            <a:t>Raw casting</a:t>
-          </a:r>
-        </a:p>
-      </dgm:t>
-    </dgm:pt>
-    <dgm:pt modelId="{1EDCB273-04D4-4217-85EC-67386AEFB355}" type="parTrans" cxnId="{402B4ED0-36CC-4776-BD20-B15610AFE87C}">
-      <dgm:prSet/>
-      <dgm:spPr/>
-    </dgm:pt>
-    <dgm:pt modelId="{97A374AB-97F2-40B6-8EE0-ECC4E6C70648}" type="sibTrans" cxnId="{402B4ED0-36CC-4776-BD20-B15610AFE87C}">
       <dgm:prSet/>
       <dgm:spPr/>
     </dgm:pt>
@@ -9656,6 +9634,28 @@
           <a:endParaRPr lang="en-IL"/>
         </a:p>
       </dgm:t>
+    </dgm:pt>
+    <dgm:pt modelId="{3AAAE9C4-95DC-4E28-BF26-616AD1212535}">
+      <dgm:prSet/>
+      <dgm:spPr/>
+      <dgm:t>
+        <a:bodyPr/>
+        <a:lstStyle/>
+        <a:p>
+          <a:r>
+            <a:rPr lang="en-US" dirty="0"/>
+            <a:t>Static members</a:t>
+          </a:r>
+        </a:p>
+      </dgm:t>
+    </dgm:pt>
+    <dgm:pt modelId="{3465041C-A890-41DC-B96A-DFADD3319CCE}" type="parTrans" cxnId="{D5CDCF7A-953F-4EE2-99E2-2D6C8669A5B8}">
+      <dgm:prSet/>
+      <dgm:spPr/>
+    </dgm:pt>
+    <dgm:pt modelId="{5C4B8C48-1D38-442C-8D7D-4460B65F44BF}" type="sibTrans" cxnId="{D5CDCF7A-953F-4EE2-99E2-2D6C8669A5B8}">
+      <dgm:prSet/>
+      <dgm:spPr/>
     </dgm:pt>
     <dgm:pt modelId="{C7568508-A123-402C-B6E5-BE4B9762FBEE}" type="pres">
       <dgm:prSet presAssocID="{7AA497C7-1905-4F44-A2FD-71564C6788E7}" presName="linear" presStyleCnt="0">
@@ -9764,70 +9764,70 @@
     </dgm:pt>
   </dgm:ptLst>
   <dgm:cxnLst>
-    <dgm:cxn modelId="{D28C0801-00A4-4702-8865-8C4BEECEA46E}" type="presOf" srcId="{4112495F-0165-43B4-A326-3F1B6CE4CF61}" destId="{6E75BE23-E928-4A8D-A9BC-1CD290D0A2B2}" srcOrd="0" destOrd="3" presId="urn:microsoft.com/office/officeart/2005/8/layout/list1"/>
-    <dgm:cxn modelId="{195B4C03-CB37-473C-95EA-5F3290E09F7E}" srcId="{9EBA827D-D668-469A-B5D8-CAF855821986}" destId="{B8C65F2F-9C55-4517-85E0-8E89F03A8D24}" srcOrd="9" destOrd="0" parTransId="{A5D4043D-3408-49DF-9D2F-4062AE535766}" sibTransId="{606A0BB6-B98A-4128-9707-91641F9D7882}"/>
+    <dgm:cxn modelId="{D28C0801-00A4-4702-8865-8C4BEECEA46E}" type="presOf" srcId="{4112495F-0165-43B4-A326-3F1B6CE4CF61}" destId="{6E75BE23-E928-4A8D-A9BC-1CD290D0A2B2}" srcOrd="0" destOrd="4" presId="urn:microsoft.com/office/officeart/2005/8/layout/list1"/>
+    <dgm:cxn modelId="{195B4C03-CB37-473C-95EA-5F3290E09F7E}" srcId="{9EBA827D-D668-469A-B5D8-CAF855821986}" destId="{B8C65F2F-9C55-4517-85E0-8E89F03A8D24}" srcOrd="8" destOrd="0" parTransId="{A5D4043D-3408-49DF-9D2F-4062AE535766}" sibTransId="{606A0BB6-B98A-4128-9707-91641F9D7882}"/>
     <dgm:cxn modelId="{4979DE04-7F1B-45BF-AB6E-D4A7553CA471}" type="presOf" srcId="{29494F5A-AB00-4047-9250-5B07965BBA4A}" destId="{7C7483BB-5ED8-40A2-B22A-5B62132FCFD2}" srcOrd="0" destOrd="1" presId="urn:microsoft.com/office/officeart/2005/8/layout/list1"/>
     <dgm:cxn modelId="{C33BEB04-C8BE-4E88-8F4B-F3BD42E07AFD}" srcId="{B0A3C049-E7D2-47E0-96EB-79D8E6BC9428}" destId="{853F2C50-FFD9-48A8-86BF-AD5CDB52CDC7}" srcOrd="3" destOrd="0" parTransId="{5919D799-2BA7-450B-9564-B8B6376FBF08}" sibTransId="{7F189A8A-F494-4737-A5FA-C94A72CC2FF7}"/>
     <dgm:cxn modelId="{B16FB007-4F26-418C-81B6-E4D58FFB5481}" srcId="{B0A3C049-E7D2-47E0-96EB-79D8E6BC9428}" destId="{00F400F1-A1A7-4AC9-8651-166392054CDB}" srcOrd="2" destOrd="0" parTransId="{03830579-33C4-4F94-8E35-3A35BD0C1738}" sibTransId="{18DF479F-2D55-47DF-A2EB-06D63F598F3D}"/>
     <dgm:cxn modelId="{19082908-802E-402D-8168-F3576B349EA2}" type="presOf" srcId="{906E6A55-6536-44D4-B2B3-60FEC6367F25}" destId="{E8457E5C-8598-451C-827A-74874040C8CE}" srcOrd="0" destOrd="0" presId="urn:microsoft.com/office/officeart/2005/8/layout/list1"/>
     <dgm:cxn modelId="{E09A900C-9D3B-42E0-9406-87655EF1D3D2}" type="presOf" srcId="{3FC387F8-733F-4650-929B-C5AE9C83EE0C}" destId="{6E75BE23-E928-4A8D-A9BC-1CD290D0A2B2}" srcOrd="0" destOrd="0" presId="urn:microsoft.com/office/officeart/2005/8/layout/list1"/>
-    <dgm:cxn modelId="{1EAB3914-AF37-43B7-A74D-13EFB4E844BE}" type="presOf" srcId="{F0412F0D-3435-4E92-B0E3-90AFF676FC72}" destId="{6E75BE23-E928-4A8D-A9BC-1CD290D0A2B2}" srcOrd="0" destOrd="4" presId="urn:microsoft.com/office/officeart/2005/8/layout/list1"/>
-    <dgm:cxn modelId="{1C3C4B20-A08C-4E43-8313-EE96465E6584}" srcId="{906E6A55-6536-44D4-B2B3-60FEC6367F25}" destId="{4112495F-0165-43B4-A326-3F1B6CE4CF61}" srcOrd="3" destOrd="0" parTransId="{7D6DAE20-7D16-4EAA-98D5-ED3F210CAD3F}" sibTransId="{6B11FDE0-493D-4F50-ABD3-FD9511FBC641}"/>
+    <dgm:cxn modelId="{1EAB3914-AF37-43B7-A74D-13EFB4E844BE}" type="presOf" srcId="{F0412F0D-3435-4E92-B0E3-90AFF676FC72}" destId="{6E75BE23-E928-4A8D-A9BC-1CD290D0A2B2}" srcOrd="0" destOrd="5" presId="urn:microsoft.com/office/officeart/2005/8/layout/list1"/>
+    <dgm:cxn modelId="{1C3C4B20-A08C-4E43-8313-EE96465E6584}" srcId="{906E6A55-6536-44D4-B2B3-60FEC6367F25}" destId="{4112495F-0165-43B4-A326-3F1B6CE4CF61}" srcOrd="4" destOrd="0" parTransId="{7D6DAE20-7D16-4EAA-98D5-ED3F210CAD3F}" sibTransId="{6B11FDE0-493D-4F50-ABD3-FD9511FBC641}"/>
     <dgm:cxn modelId="{A0451327-7A85-4AE7-AF22-2B2049FA7C6E}" type="presOf" srcId="{2EC2619A-44E4-48B1-992E-A5A3DA93F016}" destId="{6E75BE23-E928-4A8D-A9BC-1CD290D0A2B2}" srcOrd="0" destOrd="1" presId="urn:microsoft.com/office/officeart/2005/8/layout/list1"/>
-    <dgm:cxn modelId="{DC57F431-F458-4F12-A63E-8EC3DD390B98}" srcId="{9EBA827D-D668-469A-B5D8-CAF855821986}" destId="{3C79895F-5990-484A-A137-8151A835BEEF}" srcOrd="4" destOrd="0" parTransId="{92D1A6CF-7DDD-4336-B41F-65E0E537F3C4}" sibTransId="{F1944472-E6F2-4E92-AF8C-CBC6DAAA334F}"/>
-    <dgm:cxn modelId="{322D0A37-3F9F-435F-ADEC-E1F5396D569B}" srcId="{9EBA827D-D668-469A-B5D8-CAF855821986}" destId="{5E4D6931-AF8A-42A2-B02C-425D2D034CE4}" srcOrd="5" destOrd="0" parTransId="{E1D2577F-7298-4BB6-9651-3FF50185EBE0}" sibTransId="{32F3BBFF-9BA7-482E-AEF0-5B44C7231E81}"/>
-    <dgm:cxn modelId="{B5099538-6DB7-4F61-9BB7-C65FCB5050D7}" srcId="{906E6A55-6536-44D4-B2B3-60FEC6367F25}" destId="{5ED681C3-BAF6-48DB-A9F8-5E71422D7969}" srcOrd="7" destOrd="0" parTransId="{6A54229D-AE45-4516-A3E8-B223EEB714EB}" sibTransId="{537D1A8F-AA99-4D69-9C50-C62A8101D673}"/>
-    <dgm:cxn modelId="{3FCA733E-EAA9-454E-8E21-C6C5FC12C3F7}" type="presOf" srcId="{5E4D6931-AF8A-42A2-B02C-425D2D034CE4}" destId="{7C7483BB-5ED8-40A2-B22A-5B62132FCFD2}" srcOrd="0" destOrd="5" presId="urn:microsoft.com/office/officeart/2005/8/layout/list1"/>
+    <dgm:cxn modelId="{DC57F431-F458-4F12-A63E-8EC3DD390B98}" srcId="{9EBA827D-D668-469A-B5D8-CAF855821986}" destId="{3C79895F-5990-484A-A137-8151A835BEEF}" srcOrd="3" destOrd="0" parTransId="{92D1A6CF-7DDD-4336-B41F-65E0E537F3C4}" sibTransId="{F1944472-E6F2-4E92-AF8C-CBC6DAAA334F}"/>
+    <dgm:cxn modelId="{322D0A37-3F9F-435F-ADEC-E1F5396D569B}" srcId="{9EBA827D-D668-469A-B5D8-CAF855821986}" destId="{5E4D6931-AF8A-42A2-B02C-425D2D034CE4}" srcOrd="4" destOrd="0" parTransId="{E1D2577F-7298-4BB6-9651-3FF50185EBE0}" sibTransId="{32F3BBFF-9BA7-482E-AEF0-5B44C7231E81}"/>
+    <dgm:cxn modelId="{B5099538-6DB7-4F61-9BB7-C65FCB5050D7}" srcId="{906E6A55-6536-44D4-B2B3-60FEC6367F25}" destId="{5ED681C3-BAF6-48DB-A9F8-5E71422D7969}" srcOrd="8" destOrd="0" parTransId="{6A54229D-AE45-4516-A3E8-B223EEB714EB}" sibTransId="{537D1A8F-AA99-4D69-9C50-C62A8101D673}"/>
+    <dgm:cxn modelId="{3FCA733E-EAA9-454E-8E21-C6C5FC12C3F7}" type="presOf" srcId="{5E4D6931-AF8A-42A2-B02C-425D2D034CE4}" destId="{7C7483BB-5ED8-40A2-B22A-5B62132FCFD2}" srcOrd="0" destOrd="4" presId="urn:microsoft.com/office/officeart/2005/8/layout/list1"/>
     <dgm:cxn modelId="{45797341-8A86-47BA-B0A1-C1B02B0F8B97}" srcId="{B0A3C049-E7D2-47E0-96EB-79D8E6BC9428}" destId="{53850950-F286-45CF-BA79-5213E09A150D}" srcOrd="4" destOrd="0" parTransId="{D9AE1233-A55F-4727-B2F8-8A98D0588011}" sibTransId="{BA10458C-B67B-4A63-AD2C-13E71E0BF2FA}"/>
     <dgm:cxn modelId="{D6E75463-9934-4B59-82E0-DE1D8F58C267}" srcId="{7AA497C7-1905-4F44-A2FD-71564C6788E7}" destId="{906E6A55-6536-44D4-B2B3-60FEC6367F25}" srcOrd="1" destOrd="0" parTransId="{01BD4ABF-8814-4DE1-9FA1-087A8A43A13A}" sibTransId="{4390F4B3-8B57-42CA-8044-D7C2B623CA06}"/>
     <dgm:cxn modelId="{F4E2A845-D962-4FC7-A709-18207ADFE457}" type="presOf" srcId="{53850950-F286-45CF-BA79-5213E09A150D}" destId="{5656E000-DE3E-483F-8213-44AB7638CC98}" srcOrd="0" destOrd="4" presId="urn:microsoft.com/office/officeart/2005/8/layout/list1"/>
     <dgm:cxn modelId="{D8277B66-3538-4F35-8414-CCB2FA0C031A}" srcId="{9EBA827D-D668-469A-B5D8-CAF855821986}" destId="{29494F5A-AB00-4047-9250-5B07965BBA4A}" srcOrd="1" destOrd="0" parTransId="{D548FE4B-9139-4AD5-BE1F-4E5065E8D881}" sibTransId="{18FC4917-F771-44BA-AC8D-CE22BACF12AE}"/>
-    <dgm:cxn modelId="{D2CD8A67-83D3-492F-B867-6CE3560E77CC}" srcId="{906E6A55-6536-44D4-B2B3-60FEC6367F25}" destId="{EA90EDE6-09D0-4A41-AD7F-1E718894C986}" srcOrd="6" destOrd="0" parTransId="{A7DB9E97-91AC-4DFA-A405-5D8B625EDAA8}" sibTransId="{53524E3D-27C7-4117-B46F-C103E1112BD3}"/>
-    <dgm:cxn modelId="{AF419F67-948A-42DC-8830-5C7808FBEE23}" type="presOf" srcId="{EA90EDE6-09D0-4A41-AD7F-1E718894C986}" destId="{6E75BE23-E928-4A8D-A9BC-1CD290D0A2B2}" srcOrd="0" destOrd="6" presId="urn:microsoft.com/office/officeart/2005/8/layout/list1"/>
+    <dgm:cxn modelId="{D2CD8A67-83D3-492F-B867-6CE3560E77CC}" srcId="{906E6A55-6536-44D4-B2B3-60FEC6367F25}" destId="{EA90EDE6-09D0-4A41-AD7F-1E718894C986}" srcOrd="7" destOrd="0" parTransId="{A7DB9E97-91AC-4DFA-A405-5D8B625EDAA8}" sibTransId="{53524E3D-27C7-4117-B46F-C103E1112BD3}"/>
+    <dgm:cxn modelId="{AF419F67-948A-42DC-8830-5C7808FBEE23}" type="presOf" srcId="{EA90EDE6-09D0-4A41-AD7F-1E718894C986}" destId="{6E75BE23-E928-4A8D-A9BC-1CD290D0A2B2}" srcOrd="0" destOrd="7" presId="urn:microsoft.com/office/officeart/2005/8/layout/list1"/>
     <dgm:cxn modelId="{C3899F47-2866-4C4B-8297-1A44EAE7E2D3}" type="presOf" srcId="{B0A3C049-E7D2-47E0-96EB-79D8E6BC9428}" destId="{E171B225-A972-4706-9DBD-6F1B92AAA60F}" srcOrd="0" destOrd="0" presId="urn:microsoft.com/office/officeart/2005/8/layout/list1"/>
     <dgm:cxn modelId="{3541AE68-0662-4A8C-BB8F-2582CBD70942}" type="presOf" srcId="{8858E04D-6240-4388-B812-A163580C332F}" destId="{7C7483BB-5ED8-40A2-B22A-5B62132FCFD2}" srcOrd="0" destOrd="2" presId="urn:microsoft.com/office/officeart/2005/8/layout/list1"/>
-    <dgm:cxn modelId="{B1937069-A12E-4420-A0C6-AF6383750759}" type="presOf" srcId="{B16B9C93-CBB7-4D5F-BE6E-7A720A7EEA30}" destId="{6E75BE23-E928-4A8D-A9BC-1CD290D0A2B2}" srcOrd="0" destOrd="9" presId="urn:microsoft.com/office/officeart/2005/8/layout/list1"/>
+    <dgm:cxn modelId="{B1937069-A12E-4420-A0C6-AF6383750759}" type="presOf" srcId="{B16B9C93-CBB7-4D5F-BE6E-7A720A7EEA30}" destId="{6E75BE23-E928-4A8D-A9BC-1CD290D0A2B2}" srcOrd="0" destOrd="10" presId="urn:microsoft.com/office/officeart/2005/8/layout/list1"/>
     <dgm:cxn modelId="{1A9B9269-1A5B-4FF3-9657-BD0D4F2D4BC3}" type="presOf" srcId="{42758427-29AF-41A6-A0C0-B1E579D14236}" destId="{5656E000-DE3E-483F-8213-44AB7638CC98}" srcOrd="0" destOrd="0" presId="urn:microsoft.com/office/officeart/2005/8/layout/list1"/>
     <dgm:cxn modelId="{24674373-C802-4BF6-A70C-5E4C7CB4D520}" type="presOf" srcId="{906E6A55-6536-44D4-B2B3-60FEC6367F25}" destId="{F54E809A-C9AD-4893-95FB-2614467DA9DD}" srcOrd="1" destOrd="0" presId="urn:microsoft.com/office/officeart/2005/8/layout/list1"/>
     <dgm:cxn modelId="{FEC3F253-8929-4190-8DB9-C7FF43E8C283}" type="presOf" srcId="{853F2C50-FFD9-48A8-86BF-AD5CDB52CDC7}" destId="{5656E000-DE3E-483F-8213-44AB7638CC98}" srcOrd="0" destOrd="3" presId="urn:microsoft.com/office/officeart/2005/8/layout/list1"/>
-    <dgm:cxn modelId="{40A5DC54-DB09-4537-892A-96E143DFF05E}" srcId="{9EBA827D-D668-469A-B5D8-CAF855821986}" destId="{0D9433DC-FD12-4FD3-A705-ED6FFC93CFF3}" srcOrd="7" destOrd="0" parTransId="{3AC4F690-33BF-4B38-82FB-479FBE44D25B}" sibTransId="{BD644D3C-5D4A-478D-A28D-2BDC358BA4DE}"/>
-    <dgm:cxn modelId="{736B8075-86B8-4B5B-9328-3BD1344753D9}" type="presOf" srcId="{8420063D-5F61-44DA-BACA-F727A2320C19}" destId="{7C7483BB-5ED8-40A2-B22A-5B62132FCFD2}" srcOrd="0" destOrd="8" presId="urn:microsoft.com/office/officeart/2005/8/layout/list1"/>
-    <dgm:cxn modelId="{2C070B76-DC1B-41A5-BE0B-C629BDE49B86}" srcId="{906E6A55-6536-44D4-B2B3-60FEC6367F25}" destId="{B16B9C93-CBB7-4D5F-BE6E-7A720A7EEA30}" srcOrd="9" destOrd="0" parTransId="{D1C2DB0E-C4E2-4433-8312-21936E02CED7}" sibTransId="{DA4E2C8D-64A7-4D1C-B689-64969BB3A5C5}"/>
+    <dgm:cxn modelId="{40A5DC54-DB09-4537-892A-96E143DFF05E}" srcId="{9EBA827D-D668-469A-B5D8-CAF855821986}" destId="{0D9433DC-FD12-4FD3-A705-ED6FFC93CFF3}" srcOrd="6" destOrd="0" parTransId="{3AC4F690-33BF-4B38-82FB-479FBE44D25B}" sibTransId="{BD644D3C-5D4A-478D-A28D-2BDC358BA4DE}"/>
+    <dgm:cxn modelId="{736B8075-86B8-4B5B-9328-3BD1344753D9}" type="presOf" srcId="{8420063D-5F61-44DA-BACA-F727A2320C19}" destId="{7C7483BB-5ED8-40A2-B22A-5B62132FCFD2}" srcOrd="0" destOrd="7" presId="urn:microsoft.com/office/officeart/2005/8/layout/list1"/>
+    <dgm:cxn modelId="{2C070B76-DC1B-41A5-BE0B-C629BDE49B86}" srcId="{906E6A55-6536-44D4-B2B3-60FEC6367F25}" destId="{B16B9C93-CBB7-4D5F-BE6E-7A720A7EEA30}" srcOrd="10" destOrd="0" parTransId="{D1C2DB0E-C4E2-4433-8312-21936E02CED7}" sibTransId="{DA4E2C8D-64A7-4D1C-B689-64969BB3A5C5}"/>
     <dgm:cxn modelId="{F7DBE376-377A-4D8F-BF4E-D17774BE8A52}" srcId="{9EBA827D-D668-469A-B5D8-CAF855821986}" destId="{EA1ED4B9-786A-424F-BD7C-8C3EE64DF4BB}" srcOrd="0" destOrd="0" parTransId="{2B527D47-6712-4468-9D0D-F47BBF9F7177}" sibTransId="{25E8449F-5857-4815-99A4-46A74F1CFA84}"/>
-    <dgm:cxn modelId="{B49BD95A-B40A-4E02-AA7F-02B2B46F9F0B}" srcId="{9EBA827D-D668-469A-B5D8-CAF855821986}" destId="{2DC74599-C94F-448A-9BC9-58A487728A79}" srcOrd="11" destOrd="0" parTransId="{CDF5217C-8B47-4CE5-A43D-BD6A1F1301F3}" sibTransId="{A820A194-1D48-41C3-879C-09A9554B6604}"/>
+    <dgm:cxn modelId="{D5CDCF7A-953F-4EE2-99E2-2D6C8669A5B8}" srcId="{906E6A55-6536-44D4-B2B3-60FEC6367F25}" destId="{3AAAE9C4-95DC-4E28-BF26-616AD1212535}" srcOrd="2" destOrd="0" parTransId="{3465041C-A890-41DC-B96A-DFADD3319CCE}" sibTransId="{5C4B8C48-1D38-442C-8D7D-4460B65F44BF}"/>
+    <dgm:cxn modelId="{B49BD95A-B40A-4E02-AA7F-02B2B46F9F0B}" srcId="{9EBA827D-D668-469A-B5D8-CAF855821986}" destId="{2DC74599-C94F-448A-9BC9-58A487728A79}" srcOrd="10" destOrd="0" parTransId="{CDF5217C-8B47-4CE5-A43D-BD6A1F1301F3}" sibTransId="{A820A194-1D48-41C3-879C-09A9554B6604}"/>
     <dgm:cxn modelId="{5830D984-7AF9-4343-85CD-33C250EBE8C7}" type="presOf" srcId="{EA1ED4B9-786A-424F-BD7C-8C3EE64DF4BB}" destId="{7C7483BB-5ED8-40A2-B22A-5B62132FCFD2}" srcOrd="0" destOrd="0" presId="urn:microsoft.com/office/officeart/2005/8/layout/list1"/>
     <dgm:cxn modelId="{44537289-4040-45E9-838C-F05D4AACC1B8}" srcId="{906E6A55-6536-44D4-B2B3-60FEC6367F25}" destId="{2EC2619A-44E4-48B1-992E-A5A3DA93F016}" srcOrd="1" destOrd="0" parTransId="{01047297-3037-4476-9E5A-2EA7411F7774}" sibTransId="{CF672B8D-C947-4915-B0AE-9C3D62430668}"/>
     <dgm:cxn modelId="{E0F4D092-5A7C-4135-B22C-8F07D9C94B9E}" srcId="{9EBA827D-D668-469A-B5D8-CAF855821986}" destId="{8858E04D-6240-4388-B812-A163580C332F}" srcOrd="2" destOrd="0" parTransId="{FB198722-99C5-4CA8-BA63-A022B38835FF}" sibTransId="{54F2ECCE-CEE9-49AA-9618-7E118A6322E9}"/>
     <dgm:cxn modelId="{1F6D1893-D145-4CA3-9676-D6B994A96F64}" srcId="{B0A3C049-E7D2-47E0-96EB-79D8E6BC9428}" destId="{4DB917F1-3F58-4474-BDFB-D56531B94147}" srcOrd="1" destOrd="0" parTransId="{F3C9BB5F-EE1B-486D-998D-78F4E2A4886F}" sibTransId="{EEA0BAA3-94EC-4ECF-B443-F947D907A5B2}"/>
-    <dgm:cxn modelId="{92807096-A774-4558-9A98-48C2E76944F6}" type="presOf" srcId="{A1B3C311-F9BC-431C-8D04-40C6DF5EB89E}" destId="{7C7483BB-5ED8-40A2-B22A-5B62132FCFD2}" srcOrd="0" destOrd="10" presId="urn:microsoft.com/office/officeart/2005/8/layout/list1"/>
-    <dgm:cxn modelId="{9C99EA9A-4074-48F2-832E-97D37D8A1EBF}" type="presOf" srcId="{DDE3E4B9-00AB-4074-BBA0-B6B9A51F2487}" destId="{7C7483BB-5ED8-40A2-B22A-5B62132FCFD2}" srcOrd="0" destOrd="6" presId="urn:microsoft.com/office/officeart/2005/8/layout/list1"/>
-    <dgm:cxn modelId="{4929B29B-A4C7-4F3F-8D05-B0830884C5E7}" type="presOf" srcId="{CA10B913-777F-4754-BD2F-1112C8B7A543}" destId="{7C7483BB-5ED8-40A2-B22A-5B62132FCFD2}" srcOrd="0" destOrd="3" presId="urn:microsoft.com/office/officeart/2005/8/layout/list1"/>
-    <dgm:cxn modelId="{88F64A9F-2364-4AEA-B768-FD8C674D9AFD}" srcId="{906E6A55-6536-44D4-B2B3-60FEC6367F25}" destId="{FD195850-5C4E-4C11-BDFD-D6FA51DD17DA}" srcOrd="2" destOrd="0" parTransId="{2CC30E0E-D685-4334-9FE4-FF89140E7026}" sibTransId="{16F2DD03-4AA9-4AEA-BD3B-92CEDE71F47C}"/>
-    <dgm:cxn modelId="{21A1B1A2-D2D2-44F4-9DD4-9D8361660B25}" type="presOf" srcId="{FD195850-5C4E-4C11-BDFD-D6FA51DD17DA}" destId="{6E75BE23-E928-4A8D-A9BC-1CD290D0A2B2}" srcOrd="0" destOrd="2" presId="urn:microsoft.com/office/officeart/2005/8/layout/list1"/>
-    <dgm:cxn modelId="{7B4418A5-E272-4A7E-8E41-25CC6C013873}" type="presOf" srcId="{AE4852A0-D17A-4303-8B5F-4858396FF700}" destId="{6E75BE23-E928-4A8D-A9BC-1CD290D0A2B2}" srcOrd="0" destOrd="8" presId="urn:microsoft.com/office/officeart/2005/8/layout/list1"/>
-    <dgm:cxn modelId="{E68807A9-F429-4EAA-9557-954BDA5FB4E6}" srcId="{9EBA827D-D668-469A-B5D8-CAF855821986}" destId="{DDE3E4B9-00AB-4074-BBA0-B6B9A51F2487}" srcOrd="6" destOrd="0" parTransId="{52345DD6-0D8D-4CB3-9BAA-D88069C0DD21}" sibTransId="{4359CC6A-A981-43ED-8E2A-639BECEDA980}"/>
-    <dgm:cxn modelId="{2D17A0AC-B214-455D-9D30-E73F89657369}" srcId="{9EBA827D-D668-469A-B5D8-CAF855821986}" destId="{8420063D-5F61-44DA-BACA-F727A2320C19}" srcOrd="8" destOrd="0" parTransId="{5AA0B8D0-0DB5-4FF8-A505-7E9ED1085BC6}" sibTransId="{F6DC885F-0668-4B4F-AB5F-827E65AEB373}"/>
+    <dgm:cxn modelId="{92807096-A774-4558-9A98-48C2E76944F6}" type="presOf" srcId="{A1B3C311-F9BC-431C-8D04-40C6DF5EB89E}" destId="{7C7483BB-5ED8-40A2-B22A-5B62132FCFD2}" srcOrd="0" destOrd="9" presId="urn:microsoft.com/office/officeart/2005/8/layout/list1"/>
+    <dgm:cxn modelId="{7BA7B597-7DFA-475C-AC36-C3DE7D8C851B}" type="presOf" srcId="{3AAAE9C4-95DC-4E28-BF26-616AD1212535}" destId="{6E75BE23-E928-4A8D-A9BC-1CD290D0A2B2}" srcOrd="0" destOrd="2" presId="urn:microsoft.com/office/officeart/2005/8/layout/list1"/>
+    <dgm:cxn modelId="{9C99EA9A-4074-48F2-832E-97D37D8A1EBF}" type="presOf" srcId="{DDE3E4B9-00AB-4074-BBA0-B6B9A51F2487}" destId="{7C7483BB-5ED8-40A2-B22A-5B62132FCFD2}" srcOrd="0" destOrd="5" presId="urn:microsoft.com/office/officeart/2005/8/layout/list1"/>
+    <dgm:cxn modelId="{88F64A9F-2364-4AEA-B768-FD8C674D9AFD}" srcId="{906E6A55-6536-44D4-B2B3-60FEC6367F25}" destId="{FD195850-5C4E-4C11-BDFD-D6FA51DD17DA}" srcOrd="3" destOrd="0" parTransId="{2CC30E0E-D685-4334-9FE4-FF89140E7026}" sibTransId="{16F2DD03-4AA9-4AEA-BD3B-92CEDE71F47C}"/>
+    <dgm:cxn modelId="{21A1B1A2-D2D2-44F4-9DD4-9D8361660B25}" type="presOf" srcId="{FD195850-5C4E-4C11-BDFD-D6FA51DD17DA}" destId="{6E75BE23-E928-4A8D-A9BC-1CD290D0A2B2}" srcOrd="0" destOrd="3" presId="urn:microsoft.com/office/officeart/2005/8/layout/list1"/>
+    <dgm:cxn modelId="{7B4418A5-E272-4A7E-8E41-25CC6C013873}" type="presOf" srcId="{AE4852A0-D17A-4303-8B5F-4858396FF700}" destId="{6E75BE23-E928-4A8D-A9BC-1CD290D0A2B2}" srcOrd="0" destOrd="9" presId="urn:microsoft.com/office/officeart/2005/8/layout/list1"/>
+    <dgm:cxn modelId="{E68807A9-F429-4EAA-9557-954BDA5FB4E6}" srcId="{9EBA827D-D668-469A-B5D8-CAF855821986}" destId="{DDE3E4B9-00AB-4074-BBA0-B6B9A51F2487}" srcOrd="5" destOrd="0" parTransId="{52345DD6-0D8D-4CB3-9BAA-D88069C0DD21}" sibTransId="{4359CC6A-A981-43ED-8E2A-639BECEDA980}"/>
+    <dgm:cxn modelId="{2D17A0AC-B214-455D-9D30-E73F89657369}" srcId="{9EBA827D-D668-469A-B5D8-CAF855821986}" destId="{8420063D-5F61-44DA-BACA-F727A2320C19}" srcOrd="7" destOrd="0" parTransId="{5AA0B8D0-0DB5-4FF8-A505-7E9ED1085BC6}" sibTransId="{F6DC885F-0668-4B4F-AB5F-827E65AEB373}"/>
     <dgm:cxn modelId="{AA16FAAC-79AE-4079-A3D9-ECA664F7053D}" srcId="{7AA497C7-1905-4F44-A2FD-71564C6788E7}" destId="{B0A3C049-E7D2-47E0-96EB-79D8E6BC9428}" srcOrd="2" destOrd="0" parTransId="{E94E5B45-A213-47D5-B4CD-D34FA2FE96BE}" sibTransId="{02FEF901-E773-445B-89DC-04FB889C6CF6}"/>
-    <dgm:cxn modelId="{0AAA5CAE-F6D8-4DD0-B5C4-5DF4FA2A15CC}" type="presOf" srcId="{5ED681C3-BAF6-48DB-A9F8-5E71422D7969}" destId="{6E75BE23-E928-4A8D-A9BC-1CD290D0A2B2}" srcOrd="0" destOrd="7" presId="urn:microsoft.com/office/officeart/2005/8/layout/list1"/>
+    <dgm:cxn modelId="{0AAA5CAE-F6D8-4DD0-B5C4-5DF4FA2A15CC}" type="presOf" srcId="{5ED681C3-BAF6-48DB-A9F8-5E71422D7969}" destId="{6E75BE23-E928-4A8D-A9BC-1CD290D0A2B2}" srcOrd="0" destOrd="8" presId="urn:microsoft.com/office/officeart/2005/8/layout/list1"/>
     <dgm:cxn modelId="{C9BC5FB8-DE35-4787-857B-C2CC7BBE95B8}" type="presOf" srcId="{00F400F1-A1A7-4AC9-8651-166392054CDB}" destId="{5656E000-DE3E-483F-8213-44AB7638CC98}" srcOrd="0" destOrd="2" presId="urn:microsoft.com/office/officeart/2005/8/layout/list1"/>
-    <dgm:cxn modelId="{BAFC33BB-5F50-49A7-8BAB-A1697B4DE57A}" srcId="{906E6A55-6536-44D4-B2B3-60FEC6367F25}" destId="{6531B7D6-09E2-49DD-931E-F2ADD2F73952}" srcOrd="5" destOrd="0" parTransId="{81C195F1-34EE-4246-BD10-10E88CDB7CAE}" sibTransId="{95A59CB5-ADF9-4B5E-B023-F29EFF90EB35}"/>
+    <dgm:cxn modelId="{BAFC33BB-5F50-49A7-8BAB-A1697B4DE57A}" srcId="{906E6A55-6536-44D4-B2B3-60FEC6367F25}" destId="{6531B7D6-09E2-49DD-931E-F2ADD2F73952}" srcOrd="6" destOrd="0" parTransId="{81C195F1-34EE-4246-BD10-10E88CDB7CAE}" sibTransId="{95A59CB5-ADF9-4B5E-B023-F29EFF90EB35}"/>
     <dgm:cxn modelId="{9060F8BC-C513-4946-BEF3-FAF840E421FF}" type="presOf" srcId="{7AA497C7-1905-4F44-A2FD-71564C6788E7}" destId="{C7568508-A123-402C-B6E5-BE4B9762FBEE}" srcOrd="0" destOrd="0" presId="urn:microsoft.com/office/officeart/2005/8/layout/list1"/>
     <dgm:cxn modelId="{B523C2C2-BFC4-47F2-B83F-8CDA8DD32942}" srcId="{906E6A55-6536-44D4-B2B3-60FEC6367F25}" destId="{3FC387F8-733F-4650-929B-C5AE9C83EE0C}" srcOrd="0" destOrd="0" parTransId="{98B415AA-E4AB-45BA-9D48-454CE013D6F7}" sibTransId="{982861C6-A126-41CB-9598-A55298ED6C86}"/>
-    <dgm:cxn modelId="{E217F4C5-23BE-4F2C-894D-449B6F501D32}" type="presOf" srcId="{B8C65F2F-9C55-4517-85E0-8E89F03A8D24}" destId="{7C7483BB-5ED8-40A2-B22A-5B62132FCFD2}" srcOrd="0" destOrd="9" presId="urn:microsoft.com/office/officeart/2005/8/layout/list1"/>
-    <dgm:cxn modelId="{633F0CC9-B85A-48C6-8C3D-2B1C50655758}" type="presOf" srcId="{0D9433DC-FD12-4FD3-A705-ED6FFC93CFF3}" destId="{7C7483BB-5ED8-40A2-B22A-5B62132FCFD2}" srcOrd="0" destOrd="7" presId="urn:microsoft.com/office/officeart/2005/8/layout/list1"/>
-    <dgm:cxn modelId="{AD504FC9-9EA4-4C14-BB90-F8A1FC1694BF}" type="presOf" srcId="{6531B7D6-09E2-49DD-931E-F2ADD2F73952}" destId="{6E75BE23-E928-4A8D-A9BC-1CD290D0A2B2}" srcOrd="0" destOrd="5" presId="urn:microsoft.com/office/officeart/2005/8/layout/list1"/>
-    <dgm:cxn modelId="{9AB6F5CB-59F3-450B-B5CB-5A4EA0313FD8}" type="presOf" srcId="{2DC74599-C94F-448A-9BC9-58A487728A79}" destId="{7C7483BB-5ED8-40A2-B22A-5B62132FCFD2}" srcOrd="0" destOrd="11" presId="urn:microsoft.com/office/officeart/2005/8/layout/list1"/>
-    <dgm:cxn modelId="{402B4ED0-36CC-4776-BD20-B15610AFE87C}" srcId="{9EBA827D-D668-469A-B5D8-CAF855821986}" destId="{CA10B913-777F-4754-BD2F-1112C8B7A543}" srcOrd="3" destOrd="0" parTransId="{1EDCB273-04D4-4217-85EC-67386AEFB355}" sibTransId="{97A374AB-97F2-40B6-8EE0-ECC4E6C70648}"/>
+    <dgm:cxn modelId="{E217F4C5-23BE-4F2C-894D-449B6F501D32}" type="presOf" srcId="{B8C65F2F-9C55-4517-85E0-8E89F03A8D24}" destId="{7C7483BB-5ED8-40A2-B22A-5B62132FCFD2}" srcOrd="0" destOrd="8" presId="urn:microsoft.com/office/officeart/2005/8/layout/list1"/>
+    <dgm:cxn modelId="{633F0CC9-B85A-48C6-8C3D-2B1C50655758}" type="presOf" srcId="{0D9433DC-FD12-4FD3-A705-ED6FFC93CFF3}" destId="{7C7483BB-5ED8-40A2-B22A-5B62132FCFD2}" srcOrd="0" destOrd="6" presId="urn:microsoft.com/office/officeart/2005/8/layout/list1"/>
+    <dgm:cxn modelId="{AD504FC9-9EA4-4C14-BB90-F8A1FC1694BF}" type="presOf" srcId="{6531B7D6-09E2-49DD-931E-F2ADD2F73952}" destId="{6E75BE23-E928-4A8D-A9BC-1CD290D0A2B2}" srcOrd="0" destOrd="6" presId="urn:microsoft.com/office/officeart/2005/8/layout/list1"/>
+    <dgm:cxn modelId="{9AB6F5CB-59F3-450B-B5CB-5A4EA0313FD8}" type="presOf" srcId="{2DC74599-C94F-448A-9BC9-58A487728A79}" destId="{7C7483BB-5ED8-40A2-B22A-5B62132FCFD2}" srcOrd="0" destOrd="10" presId="urn:microsoft.com/office/officeart/2005/8/layout/list1"/>
     <dgm:cxn modelId="{80B84BD1-D247-4A13-BDBF-5FD14713F449}" type="presOf" srcId="{4DB917F1-3F58-4474-BDFB-D56531B94147}" destId="{5656E000-DE3E-483F-8213-44AB7638CC98}" srcOrd="0" destOrd="1" presId="urn:microsoft.com/office/officeart/2005/8/layout/list1"/>
     <dgm:cxn modelId="{A88644DD-E936-4531-A011-22577B6BA408}" type="presOf" srcId="{9EBA827D-D668-469A-B5D8-CAF855821986}" destId="{320C46A1-16B9-4AB8-BFE3-DC0053663BD7}" srcOrd="1" destOrd="0" presId="urn:microsoft.com/office/officeart/2005/8/layout/list1"/>
     <dgm:cxn modelId="{2EC8BAE0-EBD0-431F-B600-95C8A39D3A53}" type="presOf" srcId="{9EBA827D-D668-469A-B5D8-CAF855821986}" destId="{C6721B28-3ABF-4161-95DB-D004B4C0E8EA}" srcOrd="0" destOrd="0" presId="urn:microsoft.com/office/officeart/2005/8/layout/list1"/>
     <dgm:cxn modelId="{0F7E46E1-C813-4DB6-9E59-BCACB6A6B9FB}" srcId="{B0A3C049-E7D2-47E0-96EB-79D8E6BC9428}" destId="{42758427-29AF-41A6-A0C0-B1E579D14236}" srcOrd="0" destOrd="0" parTransId="{FAF29DFF-DF6E-46D7-89FD-1E4325312DA5}" sibTransId="{495E6296-CF2C-4F4A-AF30-51FC7711B2D1}"/>
-    <dgm:cxn modelId="{5BA85DE7-5972-409B-842C-30DD9559AD9C}" srcId="{906E6A55-6536-44D4-B2B3-60FEC6367F25}" destId="{AE4852A0-D17A-4303-8B5F-4858396FF700}" srcOrd="8" destOrd="0" parTransId="{84C00686-64AE-4E9A-89FB-40C45A23D922}" sibTransId="{76CBC401-4DC8-4B3D-8CEE-8E93B59C0154}"/>
+    <dgm:cxn modelId="{5BA85DE7-5972-409B-842C-30DD9559AD9C}" srcId="{906E6A55-6536-44D4-B2B3-60FEC6367F25}" destId="{AE4852A0-D17A-4303-8B5F-4858396FF700}" srcOrd="9" destOrd="0" parTransId="{84C00686-64AE-4E9A-89FB-40C45A23D922}" sibTransId="{76CBC401-4DC8-4B3D-8CEE-8E93B59C0154}"/>
     <dgm:cxn modelId="{622523F1-F0C5-471E-9991-C574E80921C0}" srcId="{7AA497C7-1905-4F44-A2FD-71564C6788E7}" destId="{9EBA827D-D668-469A-B5D8-CAF855821986}" srcOrd="0" destOrd="0" parTransId="{162C0D77-FE44-4D21-BD7F-AE759124ACA0}" sibTransId="{3361F718-FE7A-49D1-A591-B674DCB5A5BD}"/>
-    <dgm:cxn modelId="{EE6D19F8-A205-475C-BF9B-F6973A297F7C}" srcId="{9EBA827D-D668-469A-B5D8-CAF855821986}" destId="{A1B3C311-F9BC-431C-8D04-40C6DF5EB89E}" srcOrd="10" destOrd="0" parTransId="{857A54BF-4EE3-4FD6-955D-886D0F02E090}" sibTransId="{AA031870-AFED-4F87-8EB4-193229644454}"/>
-    <dgm:cxn modelId="{4E0F6DFB-1663-4CB2-B116-5270C993512A}" type="presOf" srcId="{3C79895F-5990-484A-A137-8151A835BEEF}" destId="{7C7483BB-5ED8-40A2-B22A-5B62132FCFD2}" srcOrd="0" destOrd="4" presId="urn:microsoft.com/office/officeart/2005/8/layout/list1"/>
+    <dgm:cxn modelId="{EE6D19F8-A205-475C-BF9B-F6973A297F7C}" srcId="{9EBA827D-D668-469A-B5D8-CAF855821986}" destId="{A1B3C311-F9BC-431C-8D04-40C6DF5EB89E}" srcOrd="9" destOrd="0" parTransId="{857A54BF-4EE3-4FD6-955D-886D0F02E090}" sibTransId="{AA031870-AFED-4F87-8EB4-193229644454}"/>
+    <dgm:cxn modelId="{4E0F6DFB-1663-4CB2-B116-5270C993512A}" type="presOf" srcId="{3C79895F-5990-484A-A137-8151A835BEEF}" destId="{7C7483BB-5ED8-40A2-B22A-5B62132FCFD2}" srcOrd="0" destOrd="3" presId="urn:microsoft.com/office/officeart/2005/8/layout/list1"/>
     <dgm:cxn modelId="{2ECA4FFD-BF0B-4C41-B5F0-1982A5DD9A59}" type="presOf" srcId="{B0A3C049-E7D2-47E0-96EB-79D8E6BC9428}" destId="{29A498AB-5660-42D0-968F-6AED228066EC}" srcOrd="1" destOrd="0" presId="urn:microsoft.com/office/officeart/2005/8/layout/list1"/>
-    <dgm:cxn modelId="{ABDC42FE-FF90-44A3-86FC-575213ED965D}" srcId="{906E6A55-6536-44D4-B2B3-60FEC6367F25}" destId="{F0412F0D-3435-4E92-B0E3-90AFF676FC72}" srcOrd="4" destOrd="0" parTransId="{976ED7E7-D28D-48FB-AE09-39784BA723EB}" sibTransId="{6F95CA7E-DE1C-4153-A2B5-2CE1AC4CBAD6}"/>
+    <dgm:cxn modelId="{ABDC42FE-FF90-44A3-86FC-575213ED965D}" srcId="{906E6A55-6536-44D4-B2B3-60FEC6367F25}" destId="{F0412F0D-3435-4E92-B0E3-90AFF676FC72}" srcOrd="5" destOrd="0" parTransId="{976ED7E7-D28D-48FB-AE09-39784BA723EB}" sibTransId="{6F95CA7E-DE1C-4153-A2B5-2CE1AC4CBAD6}"/>
     <dgm:cxn modelId="{7FBE0894-4481-4E1B-A024-E1772D2F5F7F}" type="presParOf" srcId="{C7568508-A123-402C-B6E5-BE4B9762FBEE}" destId="{2B726364-B311-40D1-B4D6-B449B6FCA2B8}" srcOrd="0" destOrd="0" presId="urn:microsoft.com/office/officeart/2005/8/layout/list1"/>
     <dgm:cxn modelId="{BF17FC9C-40D6-41EF-84D0-90858C7EF37B}" type="presParOf" srcId="{2B726364-B311-40D1-B4D6-B449B6FCA2B8}" destId="{C6721B28-3ABF-4161-95DB-D004B4C0E8EA}" srcOrd="0" destOrd="0" presId="urn:microsoft.com/office/officeart/2005/8/layout/list1"/>
     <dgm:cxn modelId="{9580E1F2-BE76-443C-ADE1-7D45F3917D22}" type="presParOf" srcId="{2B726364-B311-40D1-B4D6-B449B6FCA2B8}" destId="{320C46A1-16B9-4AB8-BFE3-DC0053663BD7}" srcOrd="1" destOrd="0" presId="urn:microsoft.com/office/officeart/2005/8/layout/list1"/>
@@ -12475,8 +12475,8 @@
       </dsp:nvSpPr>
       <dsp:spPr>
         <a:xfrm>
-          <a:off x="0" y="324664"/>
-          <a:ext cx="6403994" cy="1814400"/>
+          <a:off x="0" y="337264"/>
+          <a:ext cx="6403994" cy="1663200"/>
         </a:xfrm>
         <a:prstGeom prst="rect">
           <a:avLst/>
@@ -12571,25 +12571,7 @@
           </a:pPr>
           <a:r>
             <a:rPr lang="en-US" sz="800" kern="1200" dirty="0"/>
-            <a:t>Const &amp; Static</a:t>
-          </a:r>
-        </a:p>
-        <a:p>
-          <a:pPr marL="57150" lvl="1" indent="-57150" algn="l" defTabSz="355600">
-            <a:lnSpc>
-              <a:spcPct val="90000"/>
-            </a:lnSpc>
-            <a:spcBef>
-              <a:spcPct val="0"/>
-            </a:spcBef>
-            <a:spcAft>
-              <a:spcPct val="15000"/>
-            </a:spcAft>
-            <a:buChar char="•"/>
-          </a:pPr>
-          <a:r>
-            <a:rPr lang="en-US" sz="800" kern="1200" dirty="0"/>
-            <a:t>Raw casting</a:t>
+            <a:t>Const</a:t>
           </a:r>
         </a:p>
         <a:p>
@@ -12738,8 +12720,8 @@
         </a:p>
       </dsp:txBody>
       <dsp:txXfrm>
-        <a:off x="0" y="324664"/>
-        <a:ext cx="6403994" cy="1814400"/>
+        <a:off x="0" y="337264"/>
+        <a:ext cx="6403994" cy="1663200"/>
       </dsp:txXfrm>
     </dsp:sp>
     <dsp:sp modelId="{320C46A1-16B9-4AB8-BFE3-DC0053663BD7}">
@@ -12749,7 +12731,7 @@
       </dsp:nvSpPr>
       <dsp:spPr>
         <a:xfrm>
-          <a:off x="320199" y="206584"/>
+          <a:off x="320199" y="219184"/>
           <a:ext cx="4482795" cy="236160"/>
         </a:xfrm>
         <a:prstGeom prst="roundRect">
@@ -12840,7 +12822,7 @@
         </a:p>
       </dsp:txBody>
       <dsp:txXfrm>
-        <a:off x="331727" y="218112"/>
+        <a:off x="331727" y="230712"/>
         <a:ext cx="4459739" cy="213104"/>
       </dsp:txXfrm>
     </dsp:sp>
@@ -12851,8 +12833,8 @@
       </dsp:nvSpPr>
       <dsp:spPr>
         <a:xfrm>
-          <a:off x="0" y="2300344"/>
-          <a:ext cx="6403994" cy="1537199"/>
+          <a:off x="0" y="2161744"/>
+          <a:ext cx="6403994" cy="1663200"/>
         </a:xfrm>
         <a:prstGeom prst="rect">
           <a:avLst/>
@@ -12910,7 +12892,7 @@
             <a:buChar char="•"/>
           </a:pPr>
           <a:r>
-            <a:rPr lang="en-US" sz="800" kern="1200"/>
+            <a:rPr lang="en-US" sz="800" kern="1200" dirty="0"/>
             <a:t>Classes and Structs</a:t>
           </a:r>
         </a:p>
@@ -12930,6 +12912,24 @@
           <a:r>
             <a:rPr lang="en-US" sz="800" kern="1200" dirty="0"/>
             <a:t>Dynamic and static memory allocation</a:t>
+          </a:r>
+        </a:p>
+        <a:p>
+          <a:pPr marL="57150" lvl="1" indent="-57150" algn="l" defTabSz="355600">
+            <a:lnSpc>
+              <a:spcPct val="90000"/>
+            </a:lnSpc>
+            <a:spcBef>
+              <a:spcPct val="0"/>
+            </a:spcBef>
+            <a:spcAft>
+              <a:spcPct val="15000"/>
+            </a:spcAft>
+            <a:buChar char="•"/>
+          </a:pPr>
+          <a:r>
+            <a:rPr lang="en-US" sz="800" kern="1200" dirty="0"/>
+            <a:t>Static members</a:t>
           </a:r>
         </a:p>
         <a:p>
@@ -13080,8 +13080,8 @@
         </a:p>
       </dsp:txBody>
       <dsp:txXfrm>
-        <a:off x="0" y="2300344"/>
-        <a:ext cx="6403994" cy="1537199"/>
+        <a:off x="0" y="2161744"/>
+        <a:ext cx="6403994" cy="1663200"/>
       </dsp:txXfrm>
     </dsp:sp>
     <dsp:sp modelId="{F54E809A-C9AD-4893-95FB-2614467DA9DD}">
@@ -13091,7 +13091,7 @@
       </dsp:nvSpPr>
       <dsp:spPr>
         <a:xfrm>
-          <a:off x="320199" y="2182264"/>
+          <a:off x="320199" y="2043664"/>
           <a:ext cx="4482795" cy="236160"/>
         </a:xfrm>
         <a:prstGeom prst="roundRect">
@@ -13182,7 +13182,7 @@
         </a:p>
       </dsp:txBody>
       <dsp:txXfrm>
-        <a:off x="331727" y="2193792"/>
+        <a:off x="331727" y="2055192"/>
         <a:ext cx="4459739" cy="213104"/>
       </dsp:txXfrm>
     </dsp:sp>
@@ -13193,7 +13193,7 @@
       </dsp:nvSpPr>
       <dsp:spPr>
         <a:xfrm>
-          <a:off x="0" y="3998824"/>
+          <a:off x="0" y="3986224"/>
           <a:ext cx="6403994" cy="882000"/>
         </a:xfrm>
         <a:prstGeom prst="rect">
@@ -13330,7 +13330,7 @@
         </a:p>
       </dsp:txBody>
       <dsp:txXfrm>
-        <a:off x="0" y="3998824"/>
+        <a:off x="0" y="3986224"/>
         <a:ext cx="6403994" cy="882000"/>
       </dsp:txXfrm>
     </dsp:sp>
@@ -13341,7 +13341,7 @@
       </dsp:nvSpPr>
       <dsp:spPr>
         <a:xfrm>
-          <a:off x="320199" y="3880744"/>
+          <a:off x="320199" y="3868144"/>
           <a:ext cx="4482795" cy="236160"/>
         </a:xfrm>
         <a:prstGeom prst="roundRect">
@@ -13427,7 +13427,7 @@
         </a:p>
       </dsp:txBody>
       <dsp:txXfrm>
-        <a:off x="331727" y="3892272"/>
+        <a:off x="331727" y="3879672"/>
         <a:ext cx="4459739" cy="213104"/>
       </dsp:txXfrm>
     </dsp:sp>
@@ -28160,7 +28160,7 @@
           <a:p>
             <a:fld id="{DB430043-EE85-4B6C-A802-3E6B16F216A2}" type="datetimeFigureOut">
               <a:rPr lang="en-IL" smtClean="0"/>
-              <a:t>21/10/2022</a:t>
+              <a:t>02/11/2022</a:t>
             </a:fld>
             <a:endParaRPr lang="en-IL"/>
           </a:p>
@@ -28425,7 +28425,7 @@
           <a:p>
             <a:fld id="{6B548E75-1D94-41E4-8CAC-9631837BFE23}" type="datetimeFigureOut">
               <a:rPr lang="en-IL" smtClean="0"/>
-              <a:t>21/10/2022</a:t>
+              <a:t>02/11/2022</a:t>
             </a:fld>
             <a:endParaRPr lang="en-IL"/>
           </a:p>
@@ -28692,7 +28692,7 @@
           <a:p>
             <a:fld id="{6B548E75-1D94-41E4-8CAC-9631837BFE23}" type="datetimeFigureOut">
               <a:rPr lang="en-IL" smtClean="0"/>
-              <a:t>21/10/2022</a:t>
+              <a:t>02/11/2022</a:t>
             </a:fld>
             <a:endParaRPr lang="en-IL"/>
           </a:p>
@@ -28923,7 +28923,7 @@
           <a:p>
             <a:fld id="{6B548E75-1D94-41E4-8CAC-9631837BFE23}" type="datetimeFigureOut">
               <a:rPr lang="en-IL" smtClean="0"/>
-              <a:t>21/10/2022</a:t>
+              <a:t>02/11/2022</a:t>
             </a:fld>
             <a:endParaRPr lang="en-IL"/>
           </a:p>
@@ -29233,7 +29233,7 @@
           <a:p>
             <a:fld id="{6B548E75-1D94-41E4-8CAC-9631837BFE23}" type="datetimeFigureOut">
               <a:rPr lang="en-IL" smtClean="0"/>
-              <a:t>21/10/2022</a:t>
+              <a:t>02/11/2022</a:t>
             </a:fld>
             <a:endParaRPr lang="en-IL"/>
           </a:p>
@@ -29706,7 +29706,7 @@
           <a:p>
             <a:fld id="{6B548E75-1D94-41E4-8CAC-9631837BFE23}" type="datetimeFigureOut">
               <a:rPr lang="en-IL" smtClean="0"/>
-              <a:t>21/10/2022</a:t>
+              <a:t>02/11/2022</a:t>
             </a:fld>
             <a:endParaRPr lang="en-IL"/>
           </a:p>
@@ -30253,7 +30253,7 @@
           <a:p>
             <a:fld id="{6B548E75-1D94-41E4-8CAC-9631837BFE23}" type="datetimeFigureOut">
               <a:rPr lang="en-IL" smtClean="0"/>
-              <a:t>21/10/2022</a:t>
+              <a:t>02/11/2022</a:t>
             </a:fld>
             <a:endParaRPr lang="en-IL"/>
           </a:p>
@@ -31027,7 +31027,7 @@
           <a:p>
             <a:fld id="{6B548E75-1D94-41E4-8CAC-9631837BFE23}" type="datetimeFigureOut">
               <a:rPr lang="en-IL" smtClean="0"/>
-              <a:t>21/10/2022</a:t>
+              <a:t>02/11/2022</a:t>
             </a:fld>
             <a:endParaRPr lang="en-IL"/>
           </a:p>
@@ -31202,7 +31202,7 @@
           <a:p>
             <a:fld id="{6B548E75-1D94-41E4-8CAC-9631837BFE23}" type="datetimeFigureOut">
               <a:rPr lang="en-IL" smtClean="0"/>
-              <a:t>21/10/2022</a:t>
+              <a:t>02/11/2022</a:t>
             </a:fld>
             <a:endParaRPr lang="en-IL"/>
           </a:p>
@@ -31425,7 +31425,7 @@
           <a:p>
             <a:fld id="{6B548E75-1D94-41E4-8CAC-9631837BFE23}" type="datetimeFigureOut">
               <a:rPr lang="en-IL" smtClean="0"/>
-              <a:t>21/10/2022</a:t>
+              <a:t>02/11/2022</a:t>
             </a:fld>
             <a:endParaRPr lang="en-IL"/>
           </a:p>
@@ -31605,7 +31605,7 @@
           <a:p>
             <a:fld id="{6B548E75-1D94-41E4-8CAC-9631837BFE23}" type="datetimeFigureOut">
               <a:rPr lang="en-IL" smtClean="0"/>
-              <a:t>21/10/2022</a:t>
+              <a:t>02/11/2022</a:t>
             </a:fld>
             <a:endParaRPr lang="en-IL"/>
           </a:p>
@@ -31894,7 +31894,7 @@
           <a:p>
             <a:fld id="{6B548E75-1D94-41E4-8CAC-9631837BFE23}" type="datetimeFigureOut">
               <a:rPr lang="en-IL" smtClean="0"/>
-              <a:t>21/10/2022</a:t>
+              <a:t>02/11/2022</a:t>
             </a:fld>
             <a:endParaRPr lang="en-IL"/>
           </a:p>
@@ -32136,7 +32136,7 @@
           <a:p>
             <a:fld id="{6B548E75-1D94-41E4-8CAC-9631837BFE23}" type="datetimeFigureOut">
               <a:rPr lang="en-IL" smtClean="0"/>
-              <a:t>21/10/2022</a:t>
+              <a:t>02/11/2022</a:t>
             </a:fld>
             <a:endParaRPr lang="en-IL"/>
           </a:p>
@@ -32515,7 +32515,7 @@
           <a:p>
             <a:fld id="{6B548E75-1D94-41E4-8CAC-9631837BFE23}" type="datetimeFigureOut">
               <a:rPr lang="en-IL" smtClean="0"/>
-              <a:t>21/10/2022</a:t>
+              <a:t>02/11/2022</a:t>
             </a:fld>
             <a:endParaRPr lang="en-IL"/>
           </a:p>
@@ -32633,7 +32633,7 @@
           <a:p>
             <a:fld id="{6B548E75-1D94-41E4-8CAC-9631837BFE23}" type="datetimeFigureOut">
               <a:rPr lang="en-IL" smtClean="0"/>
-              <a:t>21/10/2022</a:t>
+              <a:t>02/11/2022</a:t>
             </a:fld>
             <a:endParaRPr lang="en-IL"/>
           </a:p>
@@ -32728,7 +32728,7 @@
           <a:p>
             <a:fld id="{6B548E75-1D94-41E4-8CAC-9631837BFE23}" type="datetimeFigureOut">
               <a:rPr lang="en-IL" smtClean="0"/>
-              <a:t>21/10/2022</a:t>
+              <a:t>02/11/2022</a:t>
             </a:fld>
             <a:endParaRPr lang="en-IL"/>
           </a:p>
@@ -32977,7 +32977,7 @@
           <a:p>
             <a:fld id="{6B548E75-1D94-41E4-8CAC-9631837BFE23}" type="datetimeFigureOut">
               <a:rPr lang="en-IL" smtClean="0"/>
-              <a:t>21/10/2022</a:t>
+              <a:t>02/11/2022</a:t>
             </a:fld>
             <a:endParaRPr lang="en-IL"/>
           </a:p>
@@ -33234,7 +33234,7 @@
           <a:p>
             <a:fld id="{6B548E75-1D94-41E4-8CAC-9631837BFE23}" type="datetimeFigureOut">
               <a:rPr lang="en-IL" smtClean="0"/>
-              <a:t>21/10/2022</a:t>
+              <a:t>02/11/2022</a:t>
             </a:fld>
             <a:endParaRPr lang="en-IL"/>
           </a:p>
@@ -33496,7 +33496,7 @@
           <a:p>
             <a:fld id="{6B548E75-1D94-41E4-8CAC-9631837BFE23}" type="datetimeFigureOut">
               <a:rPr lang="en-IL" smtClean="0"/>
-              <a:t>21/10/2022</a:t>
+              <a:t>02/11/2022</a:t>
             </a:fld>
             <a:endParaRPr lang="en-IL"/>
           </a:p>
@@ -36834,7 +36834,7 @@
             <p:ph idx="1"/>
             <p:extLst>
               <p:ext uri="{D42A27DB-BD31-4B8C-83A1-F6EECF244321}">
-                <p14:modId xmlns:p14="http://schemas.microsoft.com/office/powerpoint/2010/main" val="2617588547"/>
+                <p14:modId xmlns:p14="http://schemas.microsoft.com/office/powerpoint/2010/main" val="1094573603"/>
               </p:ext>
             </p:extLst>
           </p:nvPr>

</xml_diff>

<commit_message>
Updated materials for class 3
</commit_message>
<xml_diff>
--- a/Classes/Class_1/Course_Syllabus.pptx
+++ b/Classes/Class_1/Course_Syllabus.pptx
@@ -8923,11 +8923,11 @@
             <a:defRPr b="1"/>
           </a:pPr>
           <a:r>
-            <a:rPr lang="en-US" b="1"/>
+            <a:rPr lang="en-US" b="1" dirty="0"/>
             <a:t>CPP Intermediate</a:t>
           </a:r>
           <a:r>
-            <a:rPr lang="en-US"/>
+            <a:rPr lang="en-US" dirty="0"/>
             <a:t>:</a:t>
           </a:r>
         </a:p>
@@ -8945,42 +8945,6 @@
       </dgm:t>
     </dgm:pt>
     <dgm:pt modelId="{4390F4B3-8B57-42CA-8044-D7C2B623CA06}" type="sibTrans" cxnId="{D6E75463-9934-4B59-82E0-DE1D8F58C267}">
-      <dgm:prSet/>
-      <dgm:spPr/>
-      <dgm:t>
-        <a:bodyPr/>
-        <a:lstStyle/>
-        <a:p>
-          <a:endParaRPr lang="en-US"/>
-        </a:p>
-      </dgm:t>
-    </dgm:pt>
-    <dgm:pt modelId="{3FC387F8-733F-4650-929B-C5AE9C83EE0C}">
-      <dgm:prSet/>
-      <dgm:spPr/>
-      <dgm:t>
-        <a:bodyPr/>
-        <a:lstStyle/>
-        <a:p>
-          <a:r>
-            <a:rPr lang="en-US" dirty="0"/>
-            <a:t>Classes and Structs</a:t>
-          </a:r>
-        </a:p>
-      </dgm:t>
-    </dgm:pt>
-    <dgm:pt modelId="{98B415AA-E4AB-45BA-9D48-454CE013D6F7}" type="parTrans" cxnId="{B523C2C2-BFC4-47F2-B83F-8CDA8DD32942}">
-      <dgm:prSet/>
-      <dgm:spPr/>
-      <dgm:t>
-        <a:bodyPr/>
-        <a:lstStyle/>
-        <a:p>
-          <a:endParaRPr lang="en-US"/>
-        </a:p>
-      </dgm:t>
-    </dgm:pt>
-    <dgm:pt modelId="{982861C6-A126-41CB-9598-A55298ED6C86}" type="sibTrans" cxnId="{B523C2C2-BFC4-47F2-B83F-8CDA8DD32942}">
       <dgm:prSet/>
       <dgm:spPr/>
       <dgm:t>
@@ -9657,6 +9621,94 @@
       <dgm:prSet/>
       <dgm:spPr/>
     </dgm:pt>
+    <dgm:pt modelId="{1AA2D133-1946-4B6C-8E42-0AD6CBAB11B5}">
+      <dgm:prSet/>
+      <dgm:spPr/>
+      <dgm:t>
+        <a:bodyPr/>
+        <a:lstStyle/>
+        <a:p>
+          <a:r>
+            <a:rPr lang="en-US" dirty="0"/>
+            <a:t>Classes and objects</a:t>
+          </a:r>
+        </a:p>
+      </dgm:t>
+    </dgm:pt>
+    <dgm:pt modelId="{9F3E71AA-56C6-427F-A6BB-18AF65EB35E7}" type="parTrans" cxnId="{5CAD6858-8BAA-4F91-8A24-5651F921E1A8}">
+      <dgm:prSet/>
+      <dgm:spPr/>
+    </dgm:pt>
+    <dgm:pt modelId="{5E080C1C-31E8-44B8-A56E-BB068A4C07C8}" type="sibTrans" cxnId="{5CAD6858-8BAA-4F91-8A24-5651F921E1A8}">
+      <dgm:prSet/>
+      <dgm:spPr/>
+    </dgm:pt>
+    <dgm:pt modelId="{94675390-6361-400F-881C-B7D6575696A4}">
+      <dgm:prSet/>
+      <dgm:spPr/>
+      <dgm:t>
+        <a:bodyPr/>
+        <a:lstStyle/>
+        <a:p>
+          <a:r>
+            <a:rPr lang="en-US" dirty="0"/>
+            <a:t>Typedefs and aliasing</a:t>
+          </a:r>
+        </a:p>
+      </dgm:t>
+    </dgm:pt>
+    <dgm:pt modelId="{F050C9A1-108D-4A6C-A528-AF471E61937B}" type="parTrans" cxnId="{1CA81843-211E-4F67-8394-CE19368A7A3D}">
+      <dgm:prSet/>
+      <dgm:spPr/>
+    </dgm:pt>
+    <dgm:pt modelId="{C91E0276-0EB3-4BA1-AFE7-C5324E6980C3}" type="sibTrans" cxnId="{1CA81843-211E-4F67-8394-CE19368A7A3D}">
+      <dgm:prSet/>
+      <dgm:spPr/>
+    </dgm:pt>
+    <dgm:pt modelId="{8E511313-011A-4895-AE46-8AA168E0C549}">
+      <dgm:prSet/>
+      <dgm:spPr/>
+      <dgm:t>
+        <a:bodyPr/>
+        <a:lstStyle/>
+        <a:p>
+          <a:r>
+            <a:rPr lang="en-US" dirty="0"/>
+            <a:t>Build process – Quick review</a:t>
+          </a:r>
+        </a:p>
+      </dgm:t>
+    </dgm:pt>
+    <dgm:pt modelId="{BE8F4A0D-BA39-448D-AEF6-AE347660DC11}" type="parTrans" cxnId="{2E6B6217-8AF0-417B-B224-AB31A4E2160F}">
+      <dgm:prSet/>
+      <dgm:spPr/>
+    </dgm:pt>
+    <dgm:pt modelId="{AC5A487A-71F5-46BD-BBE4-76D4C039750F}" type="sibTrans" cxnId="{2E6B6217-8AF0-417B-B224-AB31A4E2160F}">
+      <dgm:prSet/>
+      <dgm:spPr/>
+    </dgm:pt>
+    <dgm:pt modelId="{C87126E9-B1F2-4CD8-8A0F-1C76BF8F1C74}">
+      <dgm:prSet/>
+      <dgm:spPr/>
+      <dgm:t>
+        <a:bodyPr/>
+        <a:lstStyle/>
+        <a:p>
+          <a:r>
+            <a:rPr lang="en-US" dirty="0"/>
+            <a:t>std::vector</a:t>
+          </a:r>
+        </a:p>
+      </dgm:t>
+    </dgm:pt>
+    <dgm:pt modelId="{14FAB00A-EB50-48DF-A31B-46C266A52C52}" type="parTrans" cxnId="{50C1654A-5E2F-4E57-A6E2-6215629A717B}">
+      <dgm:prSet/>
+      <dgm:spPr/>
+    </dgm:pt>
+    <dgm:pt modelId="{AF873543-1111-46B3-BC5F-490A050DD50B}" type="sibTrans" cxnId="{50C1654A-5E2F-4E57-A6E2-6215629A717B}">
+      <dgm:prSet/>
+      <dgm:spPr/>
+    </dgm:pt>
     <dgm:pt modelId="{C7568508-A123-402C-B6E5-BE4B9762FBEE}" type="pres">
       <dgm:prSet presAssocID="{7AA497C7-1905-4F44-A2FD-71564C6788E7}" presName="linear" presStyleCnt="0">
         <dgm:presLayoutVars>
@@ -9764,87 +9816,93 @@
     </dgm:pt>
   </dgm:ptLst>
   <dgm:cxnLst>
-    <dgm:cxn modelId="{D28C0801-00A4-4702-8865-8C4BEECEA46E}" type="presOf" srcId="{4112495F-0165-43B4-A326-3F1B6CE4CF61}" destId="{6E75BE23-E928-4A8D-A9BC-1CD290D0A2B2}" srcOrd="0" destOrd="4" presId="urn:microsoft.com/office/officeart/2005/8/layout/list1"/>
-    <dgm:cxn modelId="{195B4C03-CB37-473C-95EA-5F3290E09F7E}" srcId="{9EBA827D-D668-469A-B5D8-CAF855821986}" destId="{B8C65F2F-9C55-4517-85E0-8E89F03A8D24}" srcOrd="8" destOrd="0" parTransId="{A5D4043D-3408-49DF-9D2F-4062AE535766}" sibTransId="{606A0BB6-B98A-4128-9707-91641F9D7882}"/>
-    <dgm:cxn modelId="{4979DE04-7F1B-45BF-AB6E-D4A7553CA471}" type="presOf" srcId="{29494F5A-AB00-4047-9250-5B07965BBA4A}" destId="{7C7483BB-5ED8-40A2-B22A-5B62132FCFD2}" srcOrd="0" destOrd="1" presId="urn:microsoft.com/office/officeart/2005/8/layout/list1"/>
+    <dgm:cxn modelId="{195B4C03-CB37-473C-95EA-5F3290E09F7E}" srcId="{9EBA827D-D668-469A-B5D8-CAF855821986}" destId="{B8C65F2F-9C55-4517-85E0-8E89F03A8D24}" srcOrd="10" destOrd="0" parTransId="{A5D4043D-3408-49DF-9D2F-4062AE535766}" sibTransId="{606A0BB6-B98A-4128-9707-91641F9D7882}"/>
     <dgm:cxn modelId="{C33BEB04-C8BE-4E88-8F4B-F3BD42E07AFD}" srcId="{B0A3C049-E7D2-47E0-96EB-79D8E6BC9428}" destId="{853F2C50-FFD9-48A8-86BF-AD5CDB52CDC7}" srcOrd="3" destOrd="0" parTransId="{5919D799-2BA7-450B-9564-B8B6376FBF08}" sibTransId="{7F189A8A-F494-4737-A5FA-C94A72CC2FF7}"/>
+    <dgm:cxn modelId="{E74BFB05-6C1E-4003-B072-6939D6DAA806}" type="presOf" srcId="{DDE3E4B9-00AB-4074-BBA0-B6B9A51F2487}" destId="{7C7483BB-5ED8-40A2-B22A-5B62132FCFD2}" srcOrd="0" destOrd="5" presId="urn:microsoft.com/office/officeart/2005/8/layout/list1"/>
     <dgm:cxn modelId="{B16FB007-4F26-418C-81B6-E4D58FFB5481}" srcId="{B0A3C049-E7D2-47E0-96EB-79D8E6BC9428}" destId="{00F400F1-A1A7-4AC9-8651-166392054CDB}" srcOrd="2" destOrd="0" parTransId="{03830579-33C4-4F94-8E35-3A35BD0C1738}" sibTransId="{18DF479F-2D55-47DF-A2EB-06D63F598F3D}"/>
-    <dgm:cxn modelId="{19082908-802E-402D-8168-F3576B349EA2}" type="presOf" srcId="{906E6A55-6536-44D4-B2B3-60FEC6367F25}" destId="{E8457E5C-8598-451C-827A-74874040C8CE}" srcOrd="0" destOrd="0" presId="urn:microsoft.com/office/officeart/2005/8/layout/list1"/>
-    <dgm:cxn modelId="{E09A900C-9D3B-42E0-9406-87655EF1D3D2}" type="presOf" srcId="{3FC387F8-733F-4650-929B-C5AE9C83EE0C}" destId="{6E75BE23-E928-4A8D-A9BC-1CD290D0A2B2}" srcOrd="0" destOrd="0" presId="urn:microsoft.com/office/officeart/2005/8/layout/list1"/>
-    <dgm:cxn modelId="{1EAB3914-AF37-43B7-A74D-13EFB4E844BE}" type="presOf" srcId="{F0412F0D-3435-4E92-B0E3-90AFF676FC72}" destId="{6E75BE23-E928-4A8D-A9BC-1CD290D0A2B2}" srcOrd="0" destOrd="5" presId="urn:microsoft.com/office/officeart/2005/8/layout/list1"/>
-    <dgm:cxn modelId="{1C3C4B20-A08C-4E43-8313-EE96465E6584}" srcId="{906E6A55-6536-44D4-B2B3-60FEC6367F25}" destId="{4112495F-0165-43B4-A326-3F1B6CE4CF61}" srcOrd="4" destOrd="0" parTransId="{7D6DAE20-7D16-4EAA-98D5-ED3F210CAD3F}" sibTransId="{6B11FDE0-493D-4F50-ABD3-FD9511FBC641}"/>
-    <dgm:cxn modelId="{A0451327-7A85-4AE7-AF22-2B2049FA7C6E}" type="presOf" srcId="{2EC2619A-44E4-48B1-992E-A5A3DA93F016}" destId="{6E75BE23-E928-4A8D-A9BC-1CD290D0A2B2}" srcOrd="0" destOrd="1" presId="urn:microsoft.com/office/officeart/2005/8/layout/list1"/>
+    <dgm:cxn modelId="{A713A215-7BD5-44ED-B006-00FEAD5787D0}" type="presOf" srcId="{1AA2D133-1946-4B6C-8E42-0AD6CBAB11B5}" destId="{7C7483BB-5ED8-40A2-B22A-5B62132FCFD2}" srcOrd="0" destOrd="9" presId="urn:microsoft.com/office/officeart/2005/8/layout/list1"/>
+    <dgm:cxn modelId="{2E6B6217-8AF0-417B-B224-AB31A4E2160F}" srcId="{9EBA827D-D668-469A-B5D8-CAF855821986}" destId="{8E511313-011A-4895-AE46-8AA168E0C549}" srcOrd="8" destOrd="0" parTransId="{BE8F4A0D-BA39-448D-AEF6-AE347660DC11}" sibTransId="{AC5A487A-71F5-46BD-BBE4-76D4C039750F}"/>
+    <dgm:cxn modelId="{D2574118-A92D-4B68-931F-17D5A2D8BA51}" type="presOf" srcId="{906E6A55-6536-44D4-B2B3-60FEC6367F25}" destId="{F54E809A-C9AD-4893-95FB-2614467DA9DD}" srcOrd="1" destOrd="0" presId="urn:microsoft.com/office/officeart/2005/8/layout/list1"/>
+    <dgm:cxn modelId="{49AB6520-3DE4-4B89-A8B9-47D30D52C7F1}" type="presOf" srcId="{3C79895F-5990-484A-A137-8151A835BEEF}" destId="{7C7483BB-5ED8-40A2-B22A-5B62132FCFD2}" srcOrd="0" destOrd="3" presId="urn:microsoft.com/office/officeart/2005/8/layout/list1"/>
+    <dgm:cxn modelId="{1C3C4B20-A08C-4E43-8313-EE96465E6584}" srcId="{906E6A55-6536-44D4-B2B3-60FEC6367F25}" destId="{4112495F-0165-43B4-A326-3F1B6CE4CF61}" srcOrd="3" destOrd="0" parTransId="{7D6DAE20-7D16-4EAA-98D5-ED3F210CAD3F}" sibTransId="{6B11FDE0-493D-4F50-ABD3-FD9511FBC641}"/>
+    <dgm:cxn modelId="{8EBC1522-7AE2-44BD-8911-C7DA26299051}" type="presOf" srcId="{8858E04D-6240-4388-B812-A163580C332F}" destId="{7C7483BB-5ED8-40A2-B22A-5B62132FCFD2}" srcOrd="0" destOrd="2" presId="urn:microsoft.com/office/officeart/2005/8/layout/list1"/>
+    <dgm:cxn modelId="{565E192B-D101-454B-9AE2-2362E53D2455}" type="presOf" srcId="{5E4D6931-AF8A-42A2-B02C-425D2D034CE4}" destId="{7C7483BB-5ED8-40A2-B22A-5B62132FCFD2}" srcOrd="0" destOrd="4" presId="urn:microsoft.com/office/officeart/2005/8/layout/list1"/>
+    <dgm:cxn modelId="{4CD7AF2D-4346-439A-8718-71AECBA246A6}" type="presOf" srcId="{B8C65F2F-9C55-4517-85E0-8E89F03A8D24}" destId="{7C7483BB-5ED8-40A2-B22A-5B62132FCFD2}" srcOrd="0" destOrd="10" presId="urn:microsoft.com/office/officeart/2005/8/layout/list1"/>
+    <dgm:cxn modelId="{7015532F-7621-4C7D-AE97-CDC756CBBB98}" type="presOf" srcId="{94675390-6361-400F-881C-B7D6575696A4}" destId="{7C7483BB-5ED8-40A2-B22A-5B62132FCFD2}" srcOrd="0" destOrd="13" presId="urn:microsoft.com/office/officeart/2005/8/layout/list1"/>
     <dgm:cxn modelId="{DC57F431-F458-4F12-A63E-8EC3DD390B98}" srcId="{9EBA827D-D668-469A-B5D8-CAF855821986}" destId="{3C79895F-5990-484A-A137-8151A835BEEF}" srcOrd="3" destOrd="0" parTransId="{92D1A6CF-7DDD-4336-B41F-65E0E537F3C4}" sibTransId="{F1944472-E6F2-4E92-AF8C-CBC6DAAA334F}"/>
+    <dgm:cxn modelId="{FBD7A736-2195-41F1-A027-65CB1C566602}" type="presOf" srcId="{906E6A55-6536-44D4-B2B3-60FEC6367F25}" destId="{E8457E5C-8598-451C-827A-74874040C8CE}" srcOrd="0" destOrd="0" presId="urn:microsoft.com/office/officeart/2005/8/layout/list1"/>
     <dgm:cxn modelId="{322D0A37-3F9F-435F-ADEC-E1F5396D569B}" srcId="{9EBA827D-D668-469A-B5D8-CAF855821986}" destId="{5E4D6931-AF8A-42A2-B02C-425D2D034CE4}" srcOrd="4" destOrd="0" parTransId="{E1D2577F-7298-4BB6-9651-3FF50185EBE0}" sibTransId="{32F3BBFF-9BA7-482E-AEF0-5B44C7231E81}"/>
-    <dgm:cxn modelId="{B5099538-6DB7-4F61-9BB7-C65FCB5050D7}" srcId="{906E6A55-6536-44D4-B2B3-60FEC6367F25}" destId="{5ED681C3-BAF6-48DB-A9F8-5E71422D7969}" srcOrd="8" destOrd="0" parTransId="{6A54229D-AE45-4516-A3E8-B223EEB714EB}" sibTransId="{537D1A8F-AA99-4D69-9C50-C62A8101D673}"/>
-    <dgm:cxn modelId="{3FCA733E-EAA9-454E-8E21-C6C5FC12C3F7}" type="presOf" srcId="{5E4D6931-AF8A-42A2-B02C-425D2D034CE4}" destId="{7C7483BB-5ED8-40A2-B22A-5B62132FCFD2}" srcOrd="0" destOrd="4" presId="urn:microsoft.com/office/officeart/2005/8/layout/list1"/>
+    <dgm:cxn modelId="{B5099538-6DB7-4F61-9BB7-C65FCB5050D7}" srcId="{906E6A55-6536-44D4-B2B3-60FEC6367F25}" destId="{5ED681C3-BAF6-48DB-A9F8-5E71422D7969}" srcOrd="7" destOrd="0" parTransId="{6A54229D-AE45-4516-A3E8-B223EEB714EB}" sibTransId="{537D1A8F-AA99-4D69-9C50-C62A8101D673}"/>
+    <dgm:cxn modelId="{A66F2C39-B3B1-4659-91C6-B0CE924906A5}" type="presOf" srcId="{4112495F-0165-43B4-A326-3F1B6CE4CF61}" destId="{6E75BE23-E928-4A8D-A9BC-1CD290D0A2B2}" srcOrd="0" destOrd="3" presId="urn:microsoft.com/office/officeart/2005/8/layout/list1"/>
+    <dgm:cxn modelId="{073CE63C-4A46-48AB-B767-12204EF1BB18}" type="presOf" srcId="{AE4852A0-D17A-4303-8B5F-4858396FF700}" destId="{6E75BE23-E928-4A8D-A9BC-1CD290D0A2B2}" srcOrd="0" destOrd="8" presId="urn:microsoft.com/office/officeart/2005/8/layout/list1"/>
     <dgm:cxn modelId="{45797341-8A86-47BA-B0A1-C1B02B0F8B97}" srcId="{B0A3C049-E7D2-47E0-96EB-79D8E6BC9428}" destId="{53850950-F286-45CF-BA79-5213E09A150D}" srcOrd="4" destOrd="0" parTransId="{D9AE1233-A55F-4727-B2F8-8A98D0588011}" sibTransId="{BA10458C-B67B-4A63-AD2C-13E71E0BF2FA}"/>
+    <dgm:cxn modelId="{1CA81843-211E-4F67-8394-CE19368A7A3D}" srcId="{9EBA827D-D668-469A-B5D8-CAF855821986}" destId="{94675390-6361-400F-881C-B7D6575696A4}" srcOrd="13" destOrd="0" parTransId="{F050C9A1-108D-4A6C-A528-AF471E61937B}" sibTransId="{C91E0276-0EB3-4BA1-AFE7-C5324E6980C3}"/>
     <dgm:cxn modelId="{D6E75463-9934-4B59-82E0-DE1D8F58C267}" srcId="{7AA497C7-1905-4F44-A2FD-71564C6788E7}" destId="{906E6A55-6536-44D4-B2B3-60FEC6367F25}" srcOrd="1" destOrd="0" parTransId="{01BD4ABF-8814-4DE1-9FA1-087A8A43A13A}" sibTransId="{4390F4B3-8B57-42CA-8044-D7C2B623CA06}"/>
-    <dgm:cxn modelId="{F4E2A845-D962-4FC7-A709-18207ADFE457}" type="presOf" srcId="{53850950-F286-45CF-BA79-5213E09A150D}" destId="{5656E000-DE3E-483F-8213-44AB7638CC98}" srcOrd="0" destOrd="4" presId="urn:microsoft.com/office/officeart/2005/8/layout/list1"/>
+    <dgm:cxn modelId="{87EB7864-5D7C-485A-9E77-430519CA07FE}" type="presOf" srcId="{C87126E9-B1F2-4CD8-8A0F-1C76BF8F1C74}" destId="{7C7483BB-5ED8-40A2-B22A-5B62132FCFD2}" srcOrd="0" destOrd="12" presId="urn:microsoft.com/office/officeart/2005/8/layout/list1"/>
+    <dgm:cxn modelId="{D8964966-0D39-4016-B4D8-C9D1B765FEFE}" type="presOf" srcId="{B16B9C93-CBB7-4D5F-BE6E-7A720A7EEA30}" destId="{6E75BE23-E928-4A8D-A9BC-1CD290D0A2B2}" srcOrd="0" destOrd="9" presId="urn:microsoft.com/office/officeart/2005/8/layout/list1"/>
     <dgm:cxn modelId="{D8277B66-3538-4F35-8414-CCB2FA0C031A}" srcId="{9EBA827D-D668-469A-B5D8-CAF855821986}" destId="{29494F5A-AB00-4047-9250-5B07965BBA4A}" srcOrd="1" destOrd="0" parTransId="{D548FE4B-9139-4AD5-BE1F-4E5065E8D881}" sibTransId="{18FC4917-F771-44BA-AC8D-CE22BACF12AE}"/>
-    <dgm:cxn modelId="{D2CD8A67-83D3-492F-B867-6CE3560E77CC}" srcId="{906E6A55-6536-44D4-B2B3-60FEC6367F25}" destId="{EA90EDE6-09D0-4A41-AD7F-1E718894C986}" srcOrd="7" destOrd="0" parTransId="{A7DB9E97-91AC-4DFA-A405-5D8B625EDAA8}" sibTransId="{53524E3D-27C7-4117-B46F-C103E1112BD3}"/>
-    <dgm:cxn modelId="{AF419F67-948A-42DC-8830-5C7808FBEE23}" type="presOf" srcId="{EA90EDE6-09D0-4A41-AD7F-1E718894C986}" destId="{6E75BE23-E928-4A8D-A9BC-1CD290D0A2B2}" srcOrd="0" destOrd="7" presId="urn:microsoft.com/office/officeart/2005/8/layout/list1"/>
-    <dgm:cxn modelId="{C3899F47-2866-4C4B-8297-1A44EAE7E2D3}" type="presOf" srcId="{B0A3C049-E7D2-47E0-96EB-79D8E6BC9428}" destId="{E171B225-A972-4706-9DBD-6F1B92AAA60F}" srcOrd="0" destOrd="0" presId="urn:microsoft.com/office/officeart/2005/8/layout/list1"/>
-    <dgm:cxn modelId="{3541AE68-0662-4A8C-BB8F-2582CBD70942}" type="presOf" srcId="{8858E04D-6240-4388-B812-A163580C332F}" destId="{7C7483BB-5ED8-40A2-B22A-5B62132FCFD2}" srcOrd="0" destOrd="2" presId="urn:microsoft.com/office/officeart/2005/8/layout/list1"/>
-    <dgm:cxn modelId="{B1937069-A12E-4420-A0C6-AF6383750759}" type="presOf" srcId="{B16B9C93-CBB7-4D5F-BE6E-7A720A7EEA30}" destId="{6E75BE23-E928-4A8D-A9BC-1CD290D0A2B2}" srcOrd="0" destOrd="10" presId="urn:microsoft.com/office/officeart/2005/8/layout/list1"/>
-    <dgm:cxn modelId="{1A9B9269-1A5B-4FF3-9657-BD0D4F2D4BC3}" type="presOf" srcId="{42758427-29AF-41A6-A0C0-B1E579D14236}" destId="{5656E000-DE3E-483F-8213-44AB7638CC98}" srcOrd="0" destOrd="0" presId="urn:microsoft.com/office/officeart/2005/8/layout/list1"/>
-    <dgm:cxn modelId="{24674373-C802-4BF6-A70C-5E4C7CB4D520}" type="presOf" srcId="{906E6A55-6536-44D4-B2B3-60FEC6367F25}" destId="{F54E809A-C9AD-4893-95FB-2614467DA9DD}" srcOrd="1" destOrd="0" presId="urn:microsoft.com/office/officeart/2005/8/layout/list1"/>
-    <dgm:cxn modelId="{FEC3F253-8929-4190-8DB9-C7FF43E8C283}" type="presOf" srcId="{853F2C50-FFD9-48A8-86BF-AD5CDB52CDC7}" destId="{5656E000-DE3E-483F-8213-44AB7638CC98}" srcOrd="0" destOrd="3" presId="urn:microsoft.com/office/officeart/2005/8/layout/list1"/>
+    <dgm:cxn modelId="{D2CD8A67-83D3-492F-B867-6CE3560E77CC}" srcId="{906E6A55-6536-44D4-B2B3-60FEC6367F25}" destId="{EA90EDE6-09D0-4A41-AD7F-1E718894C986}" srcOrd="6" destOrd="0" parTransId="{A7DB9E97-91AC-4DFA-A405-5D8B625EDAA8}" sibTransId="{53524E3D-27C7-4117-B46F-C103E1112BD3}"/>
+    <dgm:cxn modelId="{50C1654A-5E2F-4E57-A6E2-6215629A717B}" srcId="{9EBA827D-D668-469A-B5D8-CAF855821986}" destId="{C87126E9-B1F2-4CD8-8A0F-1C76BF8F1C74}" srcOrd="12" destOrd="0" parTransId="{14FAB00A-EB50-48DF-A31B-46C266A52C52}" sibTransId="{AF873543-1111-46B3-BC5F-490A050DD50B}"/>
+    <dgm:cxn modelId="{6EAD8C6B-8B0C-49DF-B4D2-7D274F731197}" type="presOf" srcId="{EA90EDE6-09D0-4A41-AD7F-1E718894C986}" destId="{6E75BE23-E928-4A8D-A9BC-1CD290D0A2B2}" srcOrd="0" destOrd="6" presId="urn:microsoft.com/office/officeart/2005/8/layout/list1"/>
+    <dgm:cxn modelId="{99349C4B-F5C9-45CB-87E2-B774C798320E}" type="presOf" srcId="{F0412F0D-3435-4E92-B0E3-90AFF676FC72}" destId="{6E75BE23-E928-4A8D-A9BC-1CD290D0A2B2}" srcOrd="0" destOrd="4" presId="urn:microsoft.com/office/officeart/2005/8/layout/list1"/>
+    <dgm:cxn modelId="{5909A16C-D6DE-4F4F-A8FE-20AF26866F9A}" type="presOf" srcId="{0D9433DC-FD12-4FD3-A705-ED6FFC93CFF3}" destId="{7C7483BB-5ED8-40A2-B22A-5B62132FCFD2}" srcOrd="0" destOrd="6" presId="urn:microsoft.com/office/officeart/2005/8/layout/list1"/>
+    <dgm:cxn modelId="{A65A4171-ACB2-423C-A49B-62FE399DEB2B}" type="presOf" srcId="{4DB917F1-3F58-4474-BDFB-D56531B94147}" destId="{5656E000-DE3E-483F-8213-44AB7638CC98}" srcOrd="0" destOrd="1" presId="urn:microsoft.com/office/officeart/2005/8/layout/list1"/>
     <dgm:cxn modelId="{40A5DC54-DB09-4537-892A-96E143DFF05E}" srcId="{9EBA827D-D668-469A-B5D8-CAF855821986}" destId="{0D9433DC-FD12-4FD3-A705-ED6FFC93CFF3}" srcOrd="6" destOrd="0" parTransId="{3AC4F690-33BF-4B38-82FB-479FBE44D25B}" sibTransId="{BD644D3C-5D4A-478D-A28D-2BDC358BA4DE}"/>
-    <dgm:cxn modelId="{736B8075-86B8-4B5B-9328-3BD1344753D9}" type="presOf" srcId="{8420063D-5F61-44DA-BACA-F727A2320C19}" destId="{7C7483BB-5ED8-40A2-B22A-5B62132FCFD2}" srcOrd="0" destOrd="7" presId="urn:microsoft.com/office/officeart/2005/8/layout/list1"/>
-    <dgm:cxn modelId="{2C070B76-DC1B-41A5-BE0B-C629BDE49B86}" srcId="{906E6A55-6536-44D4-B2B3-60FEC6367F25}" destId="{B16B9C93-CBB7-4D5F-BE6E-7A720A7EEA30}" srcOrd="10" destOrd="0" parTransId="{D1C2DB0E-C4E2-4433-8312-21936E02CED7}" sibTransId="{DA4E2C8D-64A7-4D1C-B689-64969BB3A5C5}"/>
+    <dgm:cxn modelId="{2C070B76-DC1B-41A5-BE0B-C629BDE49B86}" srcId="{906E6A55-6536-44D4-B2B3-60FEC6367F25}" destId="{B16B9C93-CBB7-4D5F-BE6E-7A720A7EEA30}" srcOrd="9" destOrd="0" parTransId="{D1C2DB0E-C4E2-4433-8312-21936E02CED7}" sibTransId="{DA4E2C8D-64A7-4D1C-B689-64969BB3A5C5}"/>
+    <dgm:cxn modelId="{C96C5176-2592-4216-A6D5-49D99F8BCC98}" type="presOf" srcId="{2EC2619A-44E4-48B1-992E-A5A3DA93F016}" destId="{6E75BE23-E928-4A8D-A9BC-1CD290D0A2B2}" srcOrd="0" destOrd="0" presId="urn:microsoft.com/office/officeart/2005/8/layout/list1"/>
     <dgm:cxn modelId="{F7DBE376-377A-4D8F-BF4E-D17774BE8A52}" srcId="{9EBA827D-D668-469A-B5D8-CAF855821986}" destId="{EA1ED4B9-786A-424F-BD7C-8C3EE64DF4BB}" srcOrd="0" destOrd="0" parTransId="{2B527D47-6712-4468-9D0D-F47BBF9F7177}" sibTransId="{25E8449F-5857-4815-99A4-46A74F1CFA84}"/>
-    <dgm:cxn modelId="{D5CDCF7A-953F-4EE2-99E2-2D6C8669A5B8}" srcId="{906E6A55-6536-44D4-B2B3-60FEC6367F25}" destId="{3AAAE9C4-95DC-4E28-BF26-616AD1212535}" srcOrd="2" destOrd="0" parTransId="{3465041C-A890-41DC-B96A-DFADD3319CCE}" sibTransId="{5C4B8C48-1D38-442C-8D7D-4460B65F44BF}"/>
-    <dgm:cxn modelId="{B49BD95A-B40A-4E02-AA7F-02B2B46F9F0B}" srcId="{9EBA827D-D668-469A-B5D8-CAF855821986}" destId="{2DC74599-C94F-448A-9BC9-58A487728A79}" srcOrd="10" destOrd="0" parTransId="{CDF5217C-8B47-4CE5-A43D-BD6A1F1301F3}" sibTransId="{A820A194-1D48-41C3-879C-09A9554B6604}"/>
-    <dgm:cxn modelId="{5830D984-7AF9-4343-85CD-33C250EBE8C7}" type="presOf" srcId="{EA1ED4B9-786A-424F-BD7C-8C3EE64DF4BB}" destId="{7C7483BB-5ED8-40A2-B22A-5B62132FCFD2}" srcOrd="0" destOrd="0" presId="urn:microsoft.com/office/officeart/2005/8/layout/list1"/>
-    <dgm:cxn modelId="{44537289-4040-45E9-838C-F05D4AACC1B8}" srcId="{906E6A55-6536-44D4-B2B3-60FEC6367F25}" destId="{2EC2619A-44E4-48B1-992E-A5A3DA93F016}" srcOrd="1" destOrd="0" parTransId="{01047297-3037-4476-9E5A-2EA7411F7774}" sibTransId="{CF672B8D-C947-4915-B0AE-9C3D62430668}"/>
+    <dgm:cxn modelId="{3FBA0457-7D85-4DF8-8639-4B6D13D7530D}" type="presOf" srcId="{00F400F1-A1A7-4AC9-8651-166392054CDB}" destId="{5656E000-DE3E-483F-8213-44AB7638CC98}" srcOrd="0" destOrd="2" presId="urn:microsoft.com/office/officeart/2005/8/layout/list1"/>
+    <dgm:cxn modelId="{5CAD6858-8BAA-4F91-8A24-5651F921E1A8}" srcId="{9EBA827D-D668-469A-B5D8-CAF855821986}" destId="{1AA2D133-1946-4B6C-8E42-0AD6CBAB11B5}" srcOrd="9" destOrd="0" parTransId="{9F3E71AA-56C6-427F-A6BB-18AF65EB35E7}" sibTransId="{5E080C1C-31E8-44B8-A56E-BB068A4C07C8}"/>
+    <dgm:cxn modelId="{D5CDCF7A-953F-4EE2-99E2-2D6C8669A5B8}" srcId="{906E6A55-6536-44D4-B2B3-60FEC6367F25}" destId="{3AAAE9C4-95DC-4E28-BF26-616AD1212535}" srcOrd="1" destOrd="0" parTransId="{3465041C-A890-41DC-B96A-DFADD3319CCE}" sibTransId="{5C4B8C48-1D38-442C-8D7D-4460B65F44BF}"/>
+    <dgm:cxn modelId="{B49BD95A-B40A-4E02-AA7F-02B2B46F9F0B}" srcId="{9EBA827D-D668-469A-B5D8-CAF855821986}" destId="{2DC74599-C94F-448A-9BC9-58A487728A79}" srcOrd="14" destOrd="0" parTransId="{CDF5217C-8B47-4CE5-A43D-BD6A1F1301F3}" sibTransId="{A820A194-1D48-41C3-879C-09A9554B6604}"/>
+    <dgm:cxn modelId="{F988DC7C-5665-47A1-9214-E4799CC4D627}" type="presOf" srcId="{B0A3C049-E7D2-47E0-96EB-79D8E6BC9428}" destId="{29A498AB-5660-42D0-968F-6AED228066EC}" srcOrd="1" destOrd="0" presId="urn:microsoft.com/office/officeart/2005/8/layout/list1"/>
+    <dgm:cxn modelId="{47D61483-075E-45A5-A1A4-7C5982E9C2A0}" type="presOf" srcId="{3AAAE9C4-95DC-4E28-BF26-616AD1212535}" destId="{6E75BE23-E928-4A8D-A9BC-1CD290D0A2B2}" srcOrd="0" destOrd="1" presId="urn:microsoft.com/office/officeart/2005/8/layout/list1"/>
+    <dgm:cxn modelId="{4A7FA086-EE5C-43A3-9A48-F36AAEC54086}" type="presOf" srcId="{8E511313-011A-4895-AE46-8AA168E0C549}" destId="{7C7483BB-5ED8-40A2-B22A-5B62132FCFD2}" srcOrd="0" destOrd="8" presId="urn:microsoft.com/office/officeart/2005/8/layout/list1"/>
+    <dgm:cxn modelId="{A528ED87-EB0A-44FC-8F58-DFE7A988A8E3}" type="presOf" srcId="{2DC74599-C94F-448A-9BC9-58A487728A79}" destId="{7C7483BB-5ED8-40A2-B22A-5B62132FCFD2}" srcOrd="0" destOrd="14" presId="urn:microsoft.com/office/officeart/2005/8/layout/list1"/>
+    <dgm:cxn modelId="{F8CCF088-AA9F-41C5-A46E-D2B3152B298F}" type="presOf" srcId="{5ED681C3-BAF6-48DB-A9F8-5E71422D7969}" destId="{6E75BE23-E928-4A8D-A9BC-1CD290D0A2B2}" srcOrd="0" destOrd="7" presId="urn:microsoft.com/office/officeart/2005/8/layout/list1"/>
+    <dgm:cxn modelId="{44537289-4040-45E9-838C-F05D4AACC1B8}" srcId="{906E6A55-6536-44D4-B2B3-60FEC6367F25}" destId="{2EC2619A-44E4-48B1-992E-A5A3DA93F016}" srcOrd="0" destOrd="0" parTransId="{01047297-3037-4476-9E5A-2EA7411F7774}" sibTransId="{CF672B8D-C947-4915-B0AE-9C3D62430668}"/>
     <dgm:cxn modelId="{E0F4D092-5A7C-4135-B22C-8F07D9C94B9E}" srcId="{9EBA827D-D668-469A-B5D8-CAF855821986}" destId="{8858E04D-6240-4388-B812-A163580C332F}" srcOrd="2" destOrd="0" parTransId="{FB198722-99C5-4CA8-BA63-A022B38835FF}" sibTransId="{54F2ECCE-CEE9-49AA-9618-7E118A6322E9}"/>
     <dgm:cxn modelId="{1F6D1893-D145-4CA3-9676-D6B994A96F64}" srcId="{B0A3C049-E7D2-47E0-96EB-79D8E6BC9428}" destId="{4DB917F1-3F58-4474-BDFB-D56531B94147}" srcOrd="1" destOrd="0" parTransId="{F3C9BB5F-EE1B-486D-998D-78F4E2A4886F}" sibTransId="{EEA0BAA3-94EC-4ECF-B443-F947D907A5B2}"/>
-    <dgm:cxn modelId="{92807096-A774-4558-9A98-48C2E76944F6}" type="presOf" srcId="{A1B3C311-F9BC-431C-8D04-40C6DF5EB89E}" destId="{7C7483BB-5ED8-40A2-B22A-5B62132FCFD2}" srcOrd="0" destOrd="9" presId="urn:microsoft.com/office/officeart/2005/8/layout/list1"/>
-    <dgm:cxn modelId="{7BA7B597-7DFA-475C-AC36-C3DE7D8C851B}" type="presOf" srcId="{3AAAE9C4-95DC-4E28-BF26-616AD1212535}" destId="{6E75BE23-E928-4A8D-A9BC-1CD290D0A2B2}" srcOrd="0" destOrd="2" presId="urn:microsoft.com/office/officeart/2005/8/layout/list1"/>
-    <dgm:cxn modelId="{9C99EA9A-4074-48F2-832E-97D37D8A1EBF}" type="presOf" srcId="{DDE3E4B9-00AB-4074-BBA0-B6B9A51F2487}" destId="{7C7483BB-5ED8-40A2-B22A-5B62132FCFD2}" srcOrd="0" destOrd="5" presId="urn:microsoft.com/office/officeart/2005/8/layout/list1"/>
-    <dgm:cxn modelId="{88F64A9F-2364-4AEA-B768-FD8C674D9AFD}" srcId="{906E6A55-6536-44D4-B2B3-60FEC6367F25}" destId="{FD195850-5C4E-4C11-BDFD-D6FA51DD17DA}" srcOrd="3" destOrd="0" parTransId="{2CC30E0E-D685-4334-9FE4-FF89140E7026}" sibTransId="{16F2DD03-4AA9-4AEA-BD3B-92CEDE71F47C}"/>
-    <dgm:cxn modelId="{21A1B1A2-D2D2-44F4-9DD4-9D8361660B25}" type="presOf" srcId="{FD195850-5C4E-4C11-BDFD-D6FA51DD17DA}" destId="{6E75BE23-E928-4A8D-A9BC-1CD290D0A2B2}" srcOrd="0" destOrd="3" presId="urn:microsoft.com/office/officeart/2005/8/layout/list1"/>
-    <dgm:cxn modelId="{7B4418A5-E272-4A7E-8E41-25CC6C013873}" type="presOf" srcId="{AE4852A0-D17A-4303-8B5F-4858396FF700}" destId="{6E75BE23-E928-4A8D-A9BC-1CD290D0A2B2}" srcOrd="0" destOrd="9" presId="urn:microsoft.com/office/officeart/2005/8/layout/list1"/>
+    <dgm:cxn modelId="{8A8C0497-8FEF-4AB8-B2A4-0C2C337512E3}" type="presOf" srcId="{B0A3C049-E7D2-47E0-96EB-79D8E6BC9428}" destId="{E171B225-A972-4706-9DBD-6F1B92AAA60F}" srcOrd="0" destOrd="0" presId="urn:microsoft.com/office/officeart/2005/8/layout/list1"/>
+    <dgm:cxn modelId="{88F64A9F-2364-4AEA-B768-FD8C674D9AFD}" srcId="{906E6A55-6536-44D4-B2B3-60FEC6367F25}" destId="{FD195850-5C4E-4C11-BDFD-D6FA51DD17DA}" srcOrd="2" destOrd="0" parTransId="{2CC30E0E-D685-4334-9FE4-FF89140E7026}" sibTransId="{16F2DD03-4AA9-4AEA-BD3B-92CEDE71F47C}"/>
     <dgm:cxn modelId="{E68807A9-F429-4EAA-9557-954BDA5FB4E6}" srcId="{9EBA827D-D668-469A-B5D8-CAF855821986}" destId="{DDE3E4B9-00AB-4074-BBA0-B6B9A51F2487}" srcOrd="5" destOrd="0" parTransId="{52345DD6-0D8D-4CB3-9BAA-D88069C0DD21}" sibTransId="{4359CC6A-A981-43ED-8E2A-639BECEDA980}"/>
     <dgm:cxn modelId="{2D17A0AC-B214-455D-9D30-E73F89657369}" srcId="{9EBA827D-D668-469A-B5D8-CAF855821986}" destId="{8420063D-5F61-44DA-BACA-F727A2320C19}" srcOrd="7" destOrd="0" parTransId="{5AA0B8D0-0DB5-4FF8-A505-7E9ED1085BC6}" sibTransId="{F6DC885F-0668-4B4F-AB5F-827E65AEB373}"/>
     <dgm:cxn modelId="{AA16FAAC-79AE-4079-A3D9-ECA664F7053D}" srcId="{7AA497C7-1905-4F44-A2FD-71564C6788E7}" destId="{B0A3C049-E7D2-47E0-96EB-79D8E6BC9428}" srcOrd="2" destOrd="0" parTransId="{E94E5B45-A213-47D5-B4CD-D34FA2FE96BE}" sibTransId="{02FEF901-E773-445B-89DC-04FB889C6CF6}"/>
-    <dgm:cxn modelId="{0AAA5CAE-F6D8-4DD0-B5C4-5DF4FA2A15CC}" type="presOf" srcId="{5ED681C3-BAF6-48DB-A9F8-5E71422D7969}" destId="{6E75BE23-E928-4A8D-A9BC-1CD290D0A2B2}" srcOrd="0" destOrd="8" presId="urn:microsoft.com/office/officeart/2005/8/layout/list1"/>
-    <dgm:cxn modelId="{C9BC5FB8-DE35-4787-857B-C2CC7BBE95B8}" type="presOf" srcId="{00F400F1-A1A7-4AC9-8651-166392054CDB}" destId="{5656E000-DE3E-483F-8213-44AB7638CC98}" srcOrd="0" destOrd="2" presId="urn:microsoft.com/office/officeart/2005/8/layout/list1"/>
-    <dgm:cxn modelId="{BAFC33BB-5F50-49A7-8BAB-A1697B4DE57A}" srcId="{906E6A55-6536-44D4-B2B3-60FEC6367F25}" destId="{6531B7D6-09E2-49DD-931E-F2ADD2F73952}" srcOrd="6" destOrd="0" parTransId="{81C195F1-34EE-4246-BD10-10E88CDB7CAE}" sibTransId="{95A59CB5-ADF9-4B5E-B023-F29EFF90EB35}"/>
+    <dgm:cxn modelId="{DA5497B6-B09E-4842-98E3-8B8359307185}" type="presOf" srcId="{42758427-29AF-41A6-A0C0-B1E579D14236}" destId="{5656E000-DE3E-483F-8213-44AB7638CC98}" srcOrd="0" destOrd="0" presId="urn:microsoft.com/office/officeart/2005/8/layout/list1"/>
+    <dgm:cxn modelId="{866D01B7-F9FA-4AEB-93A0-3E814E2F5177}" type="presOf" srcId="{853F2C50-FFD9-48A8-86BF-AD5CDB52CDC7}" destId="{5656E000-DE3E-483F-8213-44AB7638CC98}" srcOrd="0" destOrd="3" presId="urn:microsoft.com/office/officeart/2005/8/layout/list1"/>
+    <dgm:cxn modelId="{BAFC33BB-5F50-49A7-8BAB-A1697B4DE57A}" srcId="{906E6A55-6536-44D4-B2B3-60FEC6367F25}" destId="{6531B7D6-09E2-49DD-931E-F2ADD2F73952}" srcOrd="5" destOrd="0" parTransId="{81C195F1-34EE-4246-BD10-10E88CDB7CAE}" sibTransId="{95A59CB5-ADF9-4B5E-B023-F29EFF90EB35}"/>
     <dgm:cxn modelId="{9060F8BC-C513-4946-BEF3-FAF840E421FF}" type="presOf" srcId="{7AA497C7-1905-4F44-A2FD-71564C6788E7}" destId="{C7568508-A123-402C-B6E5-BE4B9762FBEE}" srcOrd="0" destOrd="0" presId="urn:microsoft.com/office/officeart/2005/8/layout/list1"/>
-    <dgm:cxn modelId="{B523C2C2-BFC4-47F2-B83F-8CDA8DD32942}" srcId="{906E6A55-6536-44D4-B2B3-60FEC6367F25}" destId="{3FC387F8-733F-4650-929B-C5AE9C83EE0C}" srcOrd="0" destOrd="0" parTransId="{98B415AA-E4AB-45BA-9D48-454CE013D6F7}" sibTransId="{982861C6-A126-41CB-9598-A55298ED6C86}"/>
-    <dgm:cxn modelId="{E217F4C5-23BE-4F2C-894D-449B6F501D32}" type="presOf" srcId="{B8C65F2F-9C55-4517-85E0-8E89F03A8D24}" destId="{7C7483BB-5ED8-40A2-B22A-5B62132FCFD2}" srcOrd="0" destOrd="8" presId="urn:microsoft.com/office/officeart/2005/8/layout/list1"/>
-    <dgm:cxn modelId="{633F0CC9-B85A-48C6-8C3D-2B1C50655758}" type="presOf" srcId="{0D9433DC-FD12-4FD3-A705-ED6FFC93CFF3}" destId="{7C7483BB-5ED8-40A2-B22A-5B62132FCFD2}" srcOrd="0" destOrd="6" presId="urn:microsoft.com/office/officeart/2005/8/layout/list1"/>
-    <dgm:cxn modelId="{AD504FC9-9EA4-4C14-BB90-F8A1FC1694BF}" type="presOf" srcId="{6531B7D6-09E2-49DD-931E-F2ADD2F73952}" destId="{6E75BE23-E928-4A8D-A9BC-1CD290D0A2B2}" srcOrd="0" destOrd="6" presId="urn:microsoft.com/office/officeart/2005/8/layout/list1"/>
-    <dgm:cxn modelId="{9AB6F5CB-59F3-450B-B5CB-5A4EA0313FD8}" type="presOf" srcId="{2DC74599-C94F-448A-9BC9-58A487728A79}" destId="{7C7483BB-5ED8-40A2-B22A-5B62132FCFD2}" srcOrd="0" destOrd="10" presId="urn:microsoft.com/office/officeart/2005/8/layout/list1"/>
-    <dgm:cxn modelId="{80B84BD1-D247-4A13-BDBF-5FD14713F449}" type="presOf" srcId="{4DB917F1-3F58-4474-BDFB-D56531B94147}" destId="{5656E000-DE3E-483F-8213-44AB7638CC98}" srcOrd="0" destOrd="1" presId="urn:microsoft.com/office/officeart/2005/8/layout/list1"/>
-    <dgm:cxn modelId="{A88644DD-E936-4531-A011-22577B6BA408}" type="presOf" srcId="{9EBA827D-D668-469A-B5D8-CAF855821986}" destId="{320C46A1-16B9-4AB8-BFE3-DC0053663BD7}" srcOrd="1" destOrd="0" presId="urn:microsoft.com/office/officeart/2005/8/layout/list1"/>
-    <dgm:cxn modelId="{2EC8BAE0-EBD0-431F-B600-95C8A39D3A53}" type="presOf" srcId="{9EBA827D-D668-469A-B5D8-CAF855821986}" destId="{C6721B28-3ABF-4161-95DB-D004B4C0E8EA}" srcOrd="0" destOrd="0" presId="urn:microsoft.com/office/officeart/2005/8/layout/list1"/>
+    <dgm:cxn modelId="{44BDBBC7-53D2-4FB2-8986-95EDFEA79FDB}" type="presOf" srcId="{FD195850-5C4E-4C11-BDFD-D6FA51DD17DA}" destId="{6E75BE23-E928-4A8D-A9BC-1CD290D0A2B2}" srcOrd="0" destOrd="2" presId="urn:microsoft.com/office/officeart/2005/8/layout/list1"/>
+    <dgm:cxn modelId="{273670CC-A560-4232-85D1-E9579C365A23}" type="presOf" srcId="{29494F5A-AB00-4047-9250-5B07965BBA4A}" destId="{7C7483BB-5ED8-40A2-B22A-5B62132FCFD2}" srcOrd="0" destOrd="1" presId="urn:microsoft.com/office/officeart/2005/8/layout/list1"/>
+    <dgm:cxn modelId="{89D420CD-4326-4896-B983-262DF8E63923}" type="presOf" srcId="{6531B7D6-09E2-49DD-931E-F2ADD2F73952}" destId="{6E75BE23-E928-4A8D-A9BC-1CD290D0A2B2}" srcOrd="0" destOrd="5" presId="urn:microsoft.com/office/officeart/2005/8/layout/list1"/>
+    <dgm:cxn modelId="{B51328D2-E0DA-44B1-AE37-BAB27BBA9DCA}" type="presOf" srcId="{53850950-F286-45CF-BA79-5213E09A150D}" destId="{5656E000-DE3E-483F-8213-44AB7638CC98}" srcOrd="0" destOrd="4" presId="urn:microsoft.com/office/officeart/2005/8/layout/list1"/>
+    <dgm:cxn modelId="{FB39AAD8-9CAB-4826-B90D-E9001B93B0D0}" type="presOf" srcId="{9EBA827D-D668-469A-B5D8-CAF855821986}" destId="{320C46A1-16B9-4AB8-BFE3-DC0053663BD7}" srcOrd="1" destOrd="0" presId="urn:microsoft.com/office/officeart/2005/8/layout/list1"/>
     <dgm:cxn modelId="{0F7E46E1-C813-4DB6-9E59-BCACB6A6B9FB}" srcId="{B0A3C049-E7D2-47E0-96EB-79D8E6BC9428}" destId="{42758427-29AF-41A6-A0C0-B1E579D14236}" srcOrd="0" destOrd="0" parTransId="{FAF29DFF-DF6E-46D7-89FD-1E4325312DA5}" sibTransId="{495E6296-CF2C-4F4A-AF30-51FC7711B2D1}"/>
-    <dgm:cxn modelId="{5BA85DE7-5972-409B-842C-30DD9559AD9C}" srcId="{906E6A55-6536-44D4-B2B3-60FEC6367F25}" destId="{AE4852A0-D17A-4303-8B5F-4858396FF700}" srcOrd="9" destOrd="0" parTransId="{84C00686-64AE-4E9A-89FB-40C45A23D922}" sibTransId="{76CBC401-4DC8-4B3D-8CEE-8E93B59C0154}"/>
+    <dgm:cxn modelId="{5BA85DE7-5972-409B-842C-30DD9559AD9C}" srcId="{906E6A55-6536-44D4-B2B3-60FEC6367F25}" destId="{AE4852A0-D17A-4303-8B5F-4858396FF700}" srcOrd="8" destOrd="0" parTransId="{84C00686-64AE-4E9A-89FB-40C45A23D922}" sibTransId="{76CBC401-4DC8-4B3D-8CEE-8E93B59C0154}"/>
+    <dgm:cxn modelId="{15AD6AED-C265-4917-9C4F-D199EB4ACEA3}" type="presOf" srcId="{A1B3C311-F9BC-431C-8D04-40C6DF5EB89E}" destId="{7C7483BB-5ED8-40A2-B22A-5B62132FCFD2}" srcOrd="0" destOrd="11" presId="urn:microsoft.com/office/officeart/2005/8/layout/list1"/>
+    <dgm:cxn modelId="{4D524EEF-FB90-4118-9D0C-9BA214540D72}" type="presOf" srcId="{EA1ED4B9-786A-424F-BD7C-8C3EE64DF4BB}" destId="{7C7483BB-5ED8-40A2-B22A-5B62132FCFD2}" srcOrd="0" destOrd="0" presId="urn:microsoft.com/office/officeart/2005/8/layout/list1"/>
     <dgm:cxn modelId="{622523F1-F0C5-471E-9991-C574E80921C0}" srcId="{7AA497C7-1905-4F44-A2FD-71564C6788E7}" destId="{9EBA827D-D668-469A-B5D8-CAF855821986}" srcOrd="0" destOrd="0" parTransId="{162C0D77-FE44-4D21-BD7F-AE759124ACA0}" sibTransId="{3361F718-FE7A-49D1-A591-B674DCB5A5BD}"/>
-    <dgm:cxn modelId="{EE6D19F8-A205-475C-BF9B-F6973A297F7C}" srcId="{9EBA827D-D668-469A-B5D8-CAF855821986}" destId="{A1B3C311-F9BC-431C-8D04-40C6DF5EB89E}" srcOrd="9" destOrd="0" parTransId="{857A54BF-4EE3-4FD6-955D-886D0F02E090}" sibTransId="{AA031870-AFED-4F87-8EB4-193229644454}"/>
-    <dgm:cxn modelId="{4E0F6DFB-1663-4CB2-B116-5270C993512A}" type="presOf" srcId="{3C79895F-5990-484A-A137-8151A835BEEF}" destId="{7C7483BB-5ED8-40A2-B22A-5B62132FCFD2}" srcOrd="0" destOrd="3" presId="urn:microsoft.com/office/officeart/2005/8/layout/list1"/>
-    <dgm:cxn modelId="{2ECA4FFD-BF0B-4C41-B5F0-1982A5DD9A59}" type="presOf" srcId="{B0A3C049-E7D2-47E0-96EB-79D8E6BC9428}" destId="{29A498AB-5660-42D0-968F-6AED228066EC}" srcOrd="1" destOrd="0" presId="urn:microsoft.com/office/officeart/2005/8/layout/list1"/>
-    <dgm:cxn modelId="{ABDC42FE-FF90-44A3-86FC-575213ED965D}" srcId="{906E6A55-6536-44D4-B2B3-60FEC6367F25}" destId="{F0412F0D-3435-4E92-B0E3-90AFF676FC72}" srcOrd="5" destOrd="0" parTransId="{976ED7E7-D28D-48FB-AE09-39784BA723EB}" sibTransId="{6F95CA7E-DE1C-4153-A2B5-2CE1AC4CBAD6}"/>
-    <dgm:cxn modelId="{7FBE0894-4481-4E1B-A024-E1772D2F5F7F}" type="presParOf" srcId="{C7568508-A123-402C-B6E5-BE4B9762FBEE}" destId="{2B726364-B311-40D1-B4D6-B449B6FCA2B8}" srcOrd="0" destOrd="0" presId="urn:microsoft.com/office/officeart/2005/8/layout/list1"/>
-    <dgm:cxn modelId="{BF17FC9C-40D6-41EF-84D0-90858C7EF37B}" type="presParOf" srcId="{2B726364-B311-40D1-B4D6-B449B6FCA2B8}" destId="{C6721B28-3ABF-4161-95DB-D004B4C0E8EA}" srcOrd="0" destOrd="0" presId="urn:microsoft.com/office/officeart/2005/8/layout/list1"/>
-    <dgm:cxn modelId="{9580E1F2-BE76-443C-ADE1-7D45F3917D22}" type="presParOf" srcId="{2B726364-B311-40D1-B4D6-B449B6FCA2B8}" destId="{320C46A1-16B9-4AB8-BFE3-DC0053663BD7}" srcOrd="1" destOrd="0" presId="urn:microsoft.com/office/officeart/2005/8/layout/list1"/>
-    <dgm:cxn modelId="{1E22E3A0-6270-45BF-B69E-BAA8DA2AFFEF}" type="presParOf" srcId="{C7568508-A123-402C-B6E5-BE4B9762FBEE}" destId="{74D16253-A01C-4BD8-A5D0-F80ED6E7CB6F}" srcOrd="1" destOrd="0" presId="urn:microsoft.com/office/officeart/2005/8/layout/list1"/>
-    <dgm:cxn modelId="{46BC34E8-767F-4A37-BDCE-6C999B520491}" type="presParOf" srcId="{C7568508-A123-402C-B6E5-BE4B9762FBEE}" destId="{7C7483BB-5ED8-40A2-B22A-5B62132FCFD2}" srcOrd="2" destOrd="0" presId="urn:microsoft.com/office/officeart/2005/8/layout/list1"/>
-    <dgm:cxn modelId="{12D9221E-9490-450D-A84A-A82ABD8EC8D4}" type="presParOf" srcId="{C7568508-A123-402C-B6E5-BE4B9762FBEE}" destId="{09CAFF45-07A1-4719-98A7-E26D7EED3203}" srcOrd="3" destOrd="0" presId="urn:microsoft.com/office/officeart/2005/8/layout/list1"/>
-    <dgm:cxn modelId="{B0D923C0-3345-48BD-9415-6FAA586E0A51}" type="presParOf" srcId="{C7568508-A123-402C-B6E5-BE4B9762FBEE}" destId="{A158274F-0B30-44F5-8DBB-242760233175}" srcOrd="4" destOrd="0" presId="urn:microsoft.com/office/officeart/2005/8/layout/list1"/>
-    <dgm:cxn modelId="{5F5EACA9-682C-45CA-9DB9-898ABDC2CDD0}" type="presParOf" srcId="{A158274F-0B30-44F5-8DBB-242760233175}" destId="{E8457E5C-8598-451C-827A-74874040C8CE}" srcOrd="0" destOrd="0" presId="urn:microsoft.com/office/officeart/2005/8/layout/list1"/>
-    <dgm:cxn modelId="{E748BE68-B755-491B-9ADE-9E8DEDF9CE23}" type="presParOf" srcId="{A158274F-0B30-44F5-8DBB-242760233175}" destId="{F54E809A-C9AD-4893-95FB-2614467DA9DD}" srcOrd="1" destOrd="0" presId="urn:microsoft.com/office/officeart/2005/8/layout/list1"/>
-    <dgm:cxn modelId="{3BEE8FA3-9919-4806-9F30-673ED1A05132}" type="presParOf" srcId="{C7568508-A123-402C-B6E5-BE4B9762FBEE}" destId="{E7ADB196-6B57-4BF8-879A-F2210DFDB906}" srcOrd="5" destOrd="0" presId="urn:microsoft.com/office/officeart/2005/8/layout/list1"/>
-    <dgm:cxn modelId="{525AE38A-32A6-44D7-A9CD-3522F1FBF389}" type="presParOf" srcId="{C7568508-A123-402C-B6E5-BE4B9762FBEE}" destId="{6E75BE23-E928-4A8D-A9BC-1CD290D0A2B2}" srcOrd="6" destOrd="0" presId="urn:microsoft.com/office/officeart/2005/8/layout/list1"/>
-    <dgm:cxn modelId="{6BABFDD2-249E-487C-B1F2-16BA342F033E}" type="presParOf" srcId="{C7568508-A123-402C-B6E5-BE4B9762FBEE}" destId="{55B237AC-CD0E-400B-98A1-5974932CDAAA}" srcOrd="7" destOrd="0" presId="urn:microsoft.com/office/officeart/2005/8/layout/list1"/>
-    <dgm:cxn modelId="{2CDB269D-A900-4B64-8998-B5DE45D18A14}" type="presParOf" srcId="{C7568508-A123-402C-B6E5-BE4B9762FBEE}" destId="{DE749665-4CC0-4FF2-9A66-82D3583AC973}" srcOrd="8" destOrd="0" presId="urn:microsoft.com/office/officeart/2005/8/layout/list1"/>
-    <dgm:cxn modelId="{E8887513-B22C-4D80-8633-9242E0D55B5A}" type="presParOf" srcId="{DE749665-4CC0-4FF2-9A66-82D3583AC973}" destId="{E171B225-A972-4706-9DBD-6F1B92AAA60F}" srcOrd="0" destOrd="0" presId="urn:microsoft.com/office/officeart/2005/8/layout/list1"/>
-    <dgm:cxn modelId="{221D8260-2754-4B0D-93B5-389760DB06DA}" type="presParOf" srcId="{DE749665-4CC0-4FF2-9A66-82D3583AC973}" destId="{29A498AB-5660-42D0-968F-6AED228066EC}" srcOrd="1" destOrd="0" presId="urn:microsoft.com/office/officeart/2005/8/layout/list1"/>
-    <dgm:cxn modelId="{2DF6613C-681F-4707-96C7-209903354A67}" type="presParOf" srcId="{C7568508-A123-402C-B6E5-BE4B9762FBEE}" destId="{82D65FC3-A535-48CC-9660-F78DA372D91B}" srcOrd="9" destOrd="0" presId="urn:microsoft.com/office/officeart/2005/8/layout/list1"/>
-    <dgm:cxn modelId="{F3EA10E7-68D6-4BF2-82BD-3C94C1C2F060}" type="presParOf" srcId="{C7568508-A123-402C-B6E5-BE4B9762FBEE}" destId="{5656E000-DE3E-483F-8213-44AB7638CC98}" srcOrd="10" destOrd="0" presId="urn:microsoft.com/office/officeart/2005/8/layout/list1"/>
+    <dgm:cxn modelId="{700750F7-354B-4EC4-9C26-DBE0420DE6A2}" type="presOf" srcId="{9EBA827D-D668-469A-B5D8-CAF855821986}" destId="{C6721B28-3ABF-4161-95DB-D004B4C0E8EA}" srcOrd="0" destOrd="0" presId="urn:microsoft.com/office/officeart/2005/8/layout/list1"/>
+    <dgm:cxn modelId="{EE6D19F8-A205-475C-BF9B-F6973A297F7C}" srcId="{9EBA827D-D668-469A-B5D8-CAF855821986}" destId="{A1B3C311-F9BC-431C-8D04-40C6DF5EB89E}" srcOrd="11" destOrd="0" parTransId="{857A54BF-4EE3-4FD6-955D-886D0F02E090}" sibTransId="{AA031870-AFED-4F87-8EB4-193229644454}"/>
+    <dgm:cxn modelId="{D10A11F9-405C-4783-8215-952F8DC1160B}" type="presOf" srcId="{8420063D-5F61-44DA-BACA-F727A2320C19}" destId="{7C7483BB-5ED8-40A2-B22A-5B62132FCFD2}" srcOrd="0" destOrd="7" presId="urn:microsoft.com/office/officeart/2005/8/layout/list1"/>
+    <dgm:cxn modelId="{ABDC42FE-FF90-44A3-86FC-575213ED965D}" srcId="{906E6A55-6536-44D4-B2B3-60FEC6367F25}" destId="{F0412F0D-3435-4E92-B0E3-90AFF676FC72}" srcOrd="4" destOrd="0" parTransId="{976ED7E7-D28D-48FB-AE09-39784BA723EB}" sibTransId="{6F95CA7E-DE1C-4153-A2B5-2CE1AC4CBAD6}"/>
+    <dgm:cxn modelId="{7A1143C6-F531-4BA0-A222-716289A89ABC}" type="presParOf" srcId="{C7568508-A123-402C-B6E5-BE4B9762FBEE}" destId="{2B726364-B311-40D1-B4D6-B449B6FCA2B8}" srcOrd="0" destOrd="0" presId="urn:microsoft.com/office/officeart/2005/8/layout/list1"/>
+    <dgm:cxn modelId="{3F31224F-B0FE-4BDC-A949-B72B604CFAA8}" type="presParOf" srcId="{2B726364-B311-40D1-B4D6-B449B6FCA2B8}" destId="{C6721B28-3ABF-4161-95DB-D004B4C0E8EA}" srcOrd="0" destOrd="0" presId="urn:microsoft.com/office/officeart/2005/8/layout/list1"/>
+    <dgm:cxn modelId="{53F3F1DE-AD43-4EFE-9BB1-E2A8EF98725E}" type="presParOf" srcId="{2B726364-B311-40D1-B4D6-B449B6FCA2B8}" destId="{320C46A1-16B9-4AB8-BFE3-DC0053663BD7}" srcOrd="1" destOrd="0" presId="urn:microsoft.com/office/officeart/2005/8/layout/list1"/>
+    <dgm:cxn modelId="{E754FCDC-BC13-4DFE-BB99-8D98E81EF680}" type="presParOf" srcId="{C7568508-A123-402C-B6E5-BE4B9762FBEE}" destId="{74D16253-A01C-4BD8-A5D0-F80ED6E7CB6F}" srcOrd="1" destOrd="0" presId="urn:microsoft.com/office/officeart/2005/8/layout/list1"/>
+    <dgm:cxn modelId="{0F682B75-649F-4AFA-A315-954174FEE3E8}" type="presParOf" srcId="{C7568508-A123-402C-B6E5-BE4B9762FBEE}" destId="{7C7483BB-5ED8-40A2-B22A-5B62132FCFD2}" srcOrd="2" destOrd="0" presId="urn:microsoft.com/office/officeart/2005/8/layout/list1"/>
+    <dgm:cxn modelId="{517CCD7C-105B-4ED1-AACD-CCCFD58FC046}" type="presParOf" srcId="{C7568508-A123-402C-B6E5-BE4B9762FBEE}" destId="{09CAFF45-07A1-4719-98A7-E26D7EED3203}" srcOrd="3" destOrd="0" presId="urn:microsoft.com/office/officeart/2005/8/layout/list1"/>
+    <dgm:cxn modelId="{096F6141-CD17-4E28-80EE-2E921B495AE8}" type="presParOf" srcId="{C7568508-A123-402C-B6E5-BE4B9762FBEE}" destId="{A158274F-0B30-44F5-8DBB-242760233175}" srcOrd="4" destOrd="0" presId="urn:microsoft.com/office/officeart/2005/8/layout/list1"/>
+    <dgm:cxn modelId="{6B227CAF-CBED-4465-89F5-40C8FC19A2AC}" type="presParOf" srcId="{A158274F-0B30-44F5-8DBB-242760233175}" destId="{E8457E5C-8598-451C-827A-74874040C8CE}" srcOrd="0" destOrd="0" presId="urn:microsoft.com/office/officeart/2005/8/layout/list1"/>
+    <dgm:cxn modelId="{B8F819B1-B1E4-4AE1-93E2-346879EAD97F}" type="presParOf" srcId="{A158274F-0B30-44F5-8DBB-242760233175}" destId="{F54E809A-C9AD-4893-95FB-2614467DA9DD}" srcOrd="1" destOrd="0" presId="urn:microsoft.com/office/officeart/2005/8/layout/list1"/>
+    <dgm:cxn modelId="{78EC4932-DACB-4603-9B4C-CC908FA07CA8}" type="presParOf" srcId="{C7568508-A123-402C-B6E5-BE4B9762FBEE}" destId="{E7ADB196-6B57-4BF8-879A-F2210DFDB906}" srcOrd="5" destOrd="0" presId="urn:microsoft.com/office/officeart/2005/8/layout/list1"/>
+    <dgm:cxn modelId="{AD51630A-D4C3-4E38-B53D-497AFC229213}" type="presParOf" srcId="{C7568508-A123-402C-B6E5-BE4B9762FBEE}" destId="{6E75BE23-E928-4A8D-A9BC-1CD290D0A2B2}" srcOrd="6" destOrd="0" presId="urn:microsoft.com/office/officeart/2005/8/layout/list1"/>
+    <dgm:cxn modelId="{186AB641-BC5C-404F-A1C1-732DB5DC8442}" type="presParOf" srcId="{C7568508-A123-402C-B6E5-BE4B9762FBEE}" destId="{55B237AC-CD0E-400B-98A1-5974932CDAAA}" srcOrd="7" destOrd="0" presId="urn:microsoft.com/office/officeart/2005/8/layout/list1"/>
+    <dgm:cxn modelId="{4D288421-50F2-48EB-BAC9-25E8D3D00545}" type="presParOf" srcId="{C7568508-A123-402C-B6E5-BE4B9762FBEE}" destId="{DE749665-4CC0-4FF2-9A66-82D3583AC973}" srcOrd="8" destOrd="0" presId="urn:microsoft.com/office/officeart/2005/8/layout/list1"/>
+    <dgm:cxn modelId="{58E3976D-9130-456E-B81C-206301BFB753}" type="presParOf" srcId="{DE749665-4CC0-4FF2-9A66-82D3583AC973}" destId="{E171B225-A972-4706-9DBD-6F1B92AAA60F}" srcOrd="0" destOrd="0" presId="urn:microsoft.com/office/officeart/2005/8/layout/list1"/>
+    <dgm:cxn modelId="{65D2EE35-D1B1-44E1-A0C7-BEDBD52930AB}" type="presParOf" srcId="{DE749665-4CC0-4FF2-9A66-82D3583AC973}" destId="{29A498AB-5660-42D0-968F-6AED228066EC}" srcOrd="1" destOrd="0" presId="urn:microsoft.com/office/officeart/2005/8/layout/list1"/>
+    <dgm:cxn modelId="{5B005BE4-CD4B-4DAE-9A55-E3933C72C329}" type="presParOf" srcId="{C7568508-A123-402C-B6E5-BE4B9762FBEE}" destId="{82D65FC3-A535-48CC-9660-F78DA372D91B}" srcOrd="9" destOrd="0" presId="urn:microsoft.com/office/officeart/2005/8/layout/list1"/>
+    <dgm:cxn modelId="{606E61CB-EA65-4518-8DD9-BF0AB36BFE42}" type="presParOf" srcId="{C7568508-A123-402C-B6E5-BE4B9762FBEE}" destId="{5656E000-DE3E-483F-8213-44AB7638CC98}" srcOrd="10" destOrd="0" presId="urn:microsoft.com/office/officeart/2005/8/layout/list1"/>
   </dgm:cxnLst>
   <dgm:bg/>
   <dgm:whole/>
@@ -12475,8 +12533,8 @@
       </dsp:nvSpPr>
       <dsp:spPr>
         <a:xfrm>
-          <a:off x="0" y="337264"/>
-          <a:ext cx="6403994" cy="1663200"/>
+          <a:off x="0" y="148264"/>
+          <a:ext cx="6403994" cy="2167200"/>
         </a:xfrm>
         <a:prstGeom prst="rect">
           <a:avLst/>
@@ -12679,6 +12737,42 @@
           </a:pPr>
           <a:r>
             <a:rPr lang="en-US" sz="800" kern="1200" dirty="0"/>
+            <a:t>Build process – Quick review</a:t>
+          </a:r>
+        </a:p>
+        <a:p>
+          <a:pPr marL="57150" lvl="1" indent="-57150" algn="l" defTabSz="355600">
+            <a:lnSpc>
+              <a:spcPct val="90000"/>
+            </a:lnSpc>
+            <a:spcBef>
+              <a:spcPct val="0"/>
+            </a:spcBef>
+            <a:spcAft>
+              <a:spcPct val="15000"/>
+            </a:spcAft>
+            <a:buChar char="•"/>
+          </a:pPr>
+          <a:r>
+            <a:rPr lang="en-US" sz="800" kern="1200" dirty="0"/>
+            <a:t>Classes and objects</a:t>
+          </a:r>
+        </a:p>
+        <a:p>
+          <a:pPr marL="57150" lvl="1" indent="-57150" algn="l" defTabSz="355600">
+            <a:lnSpc>
+              <a:spcPct val="90000"/>
+            </a:lnSpc>
+            <a:spcBef>
+              <a:spcPct val="0"/>
+            </a:spcBef>
+            <a:spcAft>
+              <a:spcPct val="15000"/>
+            </a:spcAft>
+            <a:buChar char="•"/>
+          </a:pPr>
+          <a:r>
+            <a:rPr lang="en-US" sz="800" kern="1200" dirty="0"/>
             <a:t>Strings</a:t>
           </a:r>
         </a:p>
@@ -12715,13 +12809,49 @@
           </a:pPr>
           <a:r>
             <a:rPr lang="en-US" sz="800" kern="1200" dirty="0"/>
+            <a:t>std::vector</a:t>
+          </a:r>
+        </a:p>
+        <a:p>
+          <a:pPr marL="57150" lvl="1" indent="-57150" algn="l" defTabSz="355600">
+            <a:lnSpc>
+              <a:spcPct val="90000"/>
+            </a:lnSpc>
+            <a:spcBef>
+              <a:spcPct val="0"/>
+            </a:spcBef>
+            <a:spcAft>
+              <a:spcPct val="15000"/>
+            </a:spcAft>
+            <a:buChar char="•"/>
+          </a:pPr>
+          <a:r>
+            <a:rPr lang="en-US" sz="800" kern="1200" dirty="0"/>
+            <a:t>Typedefs and aliasing</a:t>
+          </a:r>
+        </a:p>
+        <a:p>
+          <a:pPr marL="57150" lvl="1" indent="-57150" algn="l" defTabSz="355600">
+            <a:lnSpc>
+              <a:spcPct val="90000"/>
+            </a:lnSpc>
+            <a:spcBef>
+              <a:spcPct val="0"/>
+            </a:spcBef>
+            <a:spcAft>
+              <a:spcPct val="15000"/>
+            </a:spcAft>
+            <a:buChar char="•"/>
+          </a:pPr>
+          <a:r>
+            <a:rPr lang="en-US" sz="800" kern="1200" dirty="0"/>
             <a:t>Macros and Preprocessor commands</a:t>
           </a:r>
         </a:p>
       </dsp:txBody>
       <dsp:txXfrm>
-        <a:off x="0" y="337264"/>
-        <a:ext cx="6403994" cy="1663200"/>
+        <a:off x="0" y="148264"/>
+        <a:ext cx="6403994" cy="2167200"/>
       </dsp:txXfrm>
     </dsp:sp>
     <dsp:sp modelId="{320C46A1-16B9-4AB8-BFE3-DC0053663BD7}">
@@ -12731,7 +12861,7 @@
       </dsp:nvSpPr>
       <dsp:spPr>
         <a:xfrm>
-          <a:off x="320199" y="219184"/>
+          <a:off x="320199" y="30184"/>
           <a:ext cx="4482795" cy="236160"/>
         </a:xfrm>
         <a:prstGeom prst="roundRect">
@@ -12822,7 +12952,7 @@
         </a:p>
       </dsp:txBody>
       <dsp:txXfrm>
-        <a:off x="331727" y="230712"/>
+        <a:off x="331727" y="41712"/>
         <a:ext cx="4459739" cy="213104"/>
       </dsp:txXfrm>
     </dsp:sp>
@@ -12833,8 +12963,8 @@
       </dsp:nvSpPr>
       <dsp:spPr>
         <a:xfrm>
-          <a:off x="0" y="2161744"/>
-          <a:ext cx="6403994" cy="1663200"/>
+          <a:off x="0" y="2476744"/>
+          <a:ext cx="6403994" cy="1537199"/>
         </a:xfrm>
         <a:prstGeom prst="rect">
           <a:avLst/>
@@ -12878,24 +13008,6 @@
           <a:noAutofit/>
         </a:bodyPr>
         <a:lstStyle/>
-        <a:p>
-          <a:pPr marL="57150" lvl="1" indent="-57150" algn="l" defTabSz="355600">
-            <a:lnSpc>
-              <a:spcPct val="90000"/>
-            </a:lnSpc>
-            <a:spcBef>
-              <a:spcPct val="0"/>
-            </a:spcBef>
-            <a:spcAft>
-              <a:spcPct val="15000"/>
-            </a:spcAft>
-            <a:buChar char="•"/>
-          </a:pPr>
-          <a:r>
-            <a:rPr lang="en-US" sz="800" kern="1200" dirty="0"/>
-            <a:t>Classes and Structs</a:t>
-          </a:r>
-        </a:p>
         <a:p>
           <a:pPr marL="57150" lvl="1" indent="-57150" algn="l" defTabSz="355600">
             <a:lnSpc>
@@ -13080,8 +13192,8 @@
         </a:p>
       </dsp:txBody>
       <dsp:txXfrm>
-        <a:off x="0" y="2161744"/>
-        <a:ext cx="6403994" cy="1663200"/>
+        <a:off x="0" y="2476744"/>
+        <a:ext cx="6403994" cy="1537199"/>
       </dsp:txXfrm>
     </dsp:sp>
     <dsp:sp modelId="{F54E809A-C9AD-4893-95FB-2614467DA9DD}">
@@ -13091,7 +13203,7 @@
       </dsp:nvSpPr>
       <dsp:spPr>
         <a:xfrm>
-          <a:off x="320199" y="2043664"/>
+          <a:off x="320199" y="2358664"/>
           <a:ext cx="4482795" cy="236160"/>
         </a:xfrm>
         <a:prstGeom prst="roundRect">
@@ -13172,17 +13284,17 @@
             <a:defRPr b="1"/>
           </a:pPr>
           <a:r>
-            <a:rPr lang="en-US" sz="800" b="1" kern="1200"/>
+            <a:rPr lang="en-US" sz="800" b="1" kern="1200" dirty="0"/>
             <a:t>CPP Intermediate</a:t>
           </a:r>
           <a:r>
-            <a:rPr lang="en-US" sz="800" kern="1200"/>
+            <a:rPr lang="en-US" sz="800" kern="1200" dirty="0"/>
             <a:t>:</a:t>
           </a:r>
         </a:p>
       </dsp:txBody>
       <dsp:txXfrm>
-        <a:off x="331727" y="2055192"/>
+        <a:off x="331727" y="2370192"/>
         <a:ext cx="4459739" cy="213104"/>
       </dsp:txXfrm>
     </dsp:sp>
@@ -13193,7 +13305,7 @@
       </dsp:nvSpPr>
       <dsp:spPr>
         <a:xfrm>
-          <a:off x="0" y="3986224"/>
+          <a:off x="0" y="4175224"/>
           <a:ext cx="6403994" cy="882000"/>
         </a:xfrm>
         <a:prstGeom prst="rect">
@@ -13330,7 +13442,7 @@
         </a:p>
       </dsp:txBody>
       <dsp:txXfrm>
-        <a:off x="0" y="3986224"/>
+        <a:off x="0" y="4175224"/>
         <a:ext cx="6403994" cy="882000"/>
       </dsp:txXfrm>
     </dsp:sp>
@@ -13341,7 +13453,7 @@
       </dsp:nvSpPr>
       <dsp:spPr>
         <a:xfrm>
-          <a:off x="320199" y="3868144"/>
+          <a:off x="320199" y="4057144"/>
           <a:ext cx="4482795" cy="236160"/>
         </a:xfrm>
         <a:prstGeom prst="roundRect">
@@ -13427,7 +13539,7 @@
         </a:p>
       </dsp:txBody>
       <dsp:txXfrm>
-        <a:off x="331727" y="3879672"/>
+        <a:off x="331727" y="4068672"/>
         <a:ext cx="4459739" cy="213104"/>
       </dsp:txXfrm>
     </dsp:sp>
@@ -28160,7 +28272,7 @@
           <a:p>
             <a:fld id="{DB430043-EE85-4B6C-A802-3E6B16F216A2}" type="datetimeFigureOut">
               <a:rPr lang="en-IL" smtClean="0"/>
-              <a:t>02/11/2022</a:t>
+              <a:t>13/11/2022</a:t>
             </a:fld>
             <a:endParaRPr lang="en-IL"/>
           </a:p>
@@ -28425,7 +28537,7 @@
           <a:p>
             <a:fld id="{6B548E75-1D94-41E4-8CAC-9631837BFE23}" type="datetimeFigureOut">
               <a:rPr lang="en-IL" smtClean="0"/>
-              <a:t>02/11/2022</a:t>
+              <a:t>13/11/2022</a:t>
             </a:fld>
             <a:endParaRPr lang="en-IL"/>
           </a:p>
@@ -28692,7 +28804,7 @@
           <a:p>
             <a:fld id="{6B548E75-1D94-41E4-8CAC-9631837BFE23}" type="datetimeFigureOut">
               <a:rPr lang="en-IL" smtClean="0"/>
-              <a:t>02/11/2022</a:t>
+              <a:t>13/11/2022</a:t>
             </a:fld>
             <a:endParaRPr lang="en-IL"/>
           </a:p>
@@ -28923,7 +29035,7 @@
           <a:p>
             <a:fld id="{6B548E75-1D94-41E4-8CAC-9631837BFE23}" type="datetimeFigureOut">
               <a:rPr lang="en-IL" smtClean="0"/>
-              <a:t>02/11/2022</a:t>
+              <a:t>13/11/2022</a:t>
             </a:fld>
             <a:endParaRPr lang="en-IL"/>
           </a:p>
@@ -29233,7 +29345,7 @@
           <a:p>
             <a:fld id="{6B548E75-1D94-41E4-8CAC-9631837BFE23}" type="datetimeFigureOut">
               <a:rPr lang="en-IL" smtClean="0"/>
-              <a:t>02/11/2022</a:t>
+              <a:t>13/11/2022</a:t>
             </a:fld>
             <a:endParaRPr lang="en-IL"/>
           </a:p>
@@ -29706,7 +29818,7 @@
           <a:p>
             <a:fld id="{6B548E75-1D94-41E4-8CAC-9631837BFE23}" type="datetimeFigureOut">
               <a:rPr lang="en-IL" smtClean="0"/>
-              <a:t>02/11/2022</a:t>
+              <a:t>13/11/2022</a:t>
             </a:fld>
             <a:endParaRPr lang="en-IL"/>
           </a:p>
@@ -30253,7 +30365,7 @@
           <a:p>
             <a:fld id="{6B548E75-1D94-41E4-8CAC-9631837BFE23}" type="datetimeFigureOut">
               <a:rPr lang="en-IL" smtClean="0"/>
-              <a:t>02/11/2022</a:t>
+              <a:t>13/11/2022</a:t>
             </a:fld>
             <a:endParaRPr lang="en-IL"/>
           </a:p>
@@ -31027,7 +31139,7 @@
           <a:p>
             <a:fld id="{6B548E75-1D94-41E4-8CAC-9631837BFE23}" type="datetimeFigureOut">
               <a:rPr lang="en-IL" smtClean="0"/>
-              <a:t>02/11/2022</a:t>
+              <a:t>13/11/2022</a:t>
             </a:fld>
             <a:endParaRPr lang="en-IL"/>
           </a:p>
@@ -31202,7 +31314,7 @@
           <a:p>
             <a:fld id="{6B548E75-1D94-41E4-8CAC-9631837BFE23}" type="datetimeFigureOut">
               <a:rPr lang="en-IL" smtClean="0"/>
-              <a:t>02/11/2022</a:t>
+              <a:t>13/11/2022</a:t>
             </a:fld>
             <a:endParaRPr lang="en-IL"/>
           </a:p>
@@ -31425,7 +31537,7 @@
           <a:p>
             <a:fld id="{6B548E75-1D94-41E4-8CAC-9631837BFE23}" type="datetimeFigureOut">
               <a:rPr lang="en-IL" smtClean="0"/>
-              <a:t>02/11/2022</a:t>
+              <a:t>13/11/2022</a:t>
             </a:fld>
             <a:endParaRPr lang="en-IL"/>
           </a:p>
@@ -31605,7 +31717,7 @@
           <a:p>
             <a:fld id="{6B548E75-1D94-41E4-8CAC-9631837BFE23}" type="datetimeFigureOut">
               <a:rPr lang="en-IL" smtClean="0"/>
-              <a:t>02/11/2022</a:t>
+              <a:t>13/11/2022</a:t>
             </a:fld>
             <a:endParaRPr lang="en-IL"/>
           </a:p>
@@ -31894,7 +32006,7 @@
           <a:p>
             <a:fld id="{6B548E75-1D94-41E4-8CAC-9631837BFE23}" type="datetimeFigureOut">
               <a:rPr lang="en-IL" smtClean="0"/>
-              <a:t>02/11/2022</a:t>
+              <a:t>13/11/2022</a:t>
             </a:fld>
             <a:endParaRPr lang="en-IL"/>
           </a:p>
@@ -32136,7 +32248,7 @@
           <a:p>
             <a:fld id="{6B548E75-1D94-41E4-8CAC-9631837BFE23}" type="datetimeFigureOut">
               <a:rPr lang="en-IL" smtClean="0"/>
-              <a:t>02/11/2022</a:t>
+              <a:t>13/11/2022</a:t>
             </a:fld>
             <a:endParaRPr lang="en-IL"/>
           </a:p>
@@ -32515,7 +32627,7 @@
           <a:p>
             <a:fld id="{6B548E75-1D94-41E4-8CAC-9631837BFE23}" type="datetimeFigureOut">
               <a:rPr lang="en-IL" smtClean="0"/>
-              <a:t>02/11/2022</a:t>
+              <a:t>13/11/2022</a:t>
             </a:fld>
             <a:endParaRPr lang="en-IL"/>
           </a:p>
@@ -32633,7 +32745,7 @@
           <a:p>
             <a:fld id="{6B548E75-1D94-41E4-8CAC-9631837BFE23}" type="datetimeFigureOut">
               <a:rPr lang="en-IL" smtClean="0"/>
-              <a:t>02/11/2022</a:t>
+              <a:t>13/11/2022</a:t>
             </a:fld>
             <a:endParaRPr lang="en-IL"/>
           </a:p>
@@ -32728,7 +32840,7 @@
           <a:p>
             <a:fld id="{6B548E75-1D94-41E4-8CAC-9631837BFE23}" type="datetimeFigureOut">
               <a:rPr lang="en-IL" smtClean="0"/>
-              <a:t>02/11/2022</a:t>
+              <a:t>13/11/2022</a:t>
             </a:fld>
             <a:endParaRPr lang="en-IL"/>
           </a:p>
@@ -32977,7 +33089,7 @@
           <a:p>
             <a:fld id="{6B548E75-1D94-41E4-8CAC-9631837BFE23}" type="datetimeFigureOut">
               <a:rPr lang="en-IL" smtClean="0"/>
-              <a:t>02/11/2022</a:t>
+              <a:t>13/11/2022</a:t>
             </a:fld>
             <a:endParaRPr lang="en-IL"/>
           </a:p>
@@ -33234,7 +33346,7 @@
           <a:p>
             <a:fld id="{6B548E75-1D94-41E4-8CAC-9631837BFE23}" type="datetimeFigureOut">
               <a:rPr lang="en-IL" smtClean="0"/>
-              <a:t>02/11/2022</a:t>
+              <a:t>13/11/2022</a:t>
             </a:fld>
             <a:endParaRPr lang="en-IL"/>
           </a:p>
@@ -33496,7 +33608,7 @@
           <a:p>
             <a:fld id="{6B548E75-1D94-41E4-8CAC-9631837BFE23}" type="datetimeFigureOut">
               <a:rPr lang="en-IL" smtClean="0"/>
-              <a:t>02/11/2022</a:t>
+              <a:t>13/11/2022</a:t>
             </a:fld>
             <a:endParaRPr lang="en-IL"/>
           </a:p>
@@ -34794,14 +34906,14 @@
             <p:ph idx="1"/>
             <p:extLst>
               <p:ext uri="{D42A27DB-BD31-4B8C-83A1-F6EECF244321}">
-                <p14:modId xmlns:p14="http://schemas.microsoft.com/office/powerpoint/2010/main" val="2601852493"/>
+                <p14:modId xmlns:p14="http://schemas.microsoft.com/office/powerpoint/2010/main" val="2390218246"/>
               </p:ext>
             </p:extLst>
           </p:nvPr>
         </p:nvGraphicFramePr>
         <p:xfrm>
           <a:off x="1261484" y="1975655"/>
-          <a:ext cx="9133464" cy="2971705"/>
+          <a:ext cx="9133464" cy="3505105"/>
         </p:xfrm>
         <a:graphic>
           <a:graphicData uri="http://schemas.openxmlformats.org/drawingml/2006/table">
@@ -34901,9 +35013,86 @@
                     <a:bodyPr/>
                     <a:lstStyle/>
                     <a:p>
+                      <a:pPr lvl="0"/>
                       <a:r>
                         <a:rPr lang="en-US" sz="1500" dirty="0"/>
-                        <a:t>CPP basic to intermediate: from Strings to memory allocation</a:t>
+                        <a:t>CPP basic: </a:t>
+                      </a:r>
+                    </a:p>
+                    <a:p>
+                      <a:pPr marL="285750" lvl="0" indent="-285750">
+                        <a:buFont typeface="Arial" panose="020B0604020202020204" pitchFamily="34" charset="0"/>
+                        <a:buChar char="•"/>
+                      </a:pPr>
+                      <a:r>
+                        <a:rPr lang="en-US" sz="1600" dirty="0"/>
+                        <a:t>Build process (quick review)</a:t>
+                      </a:r>
+                    </a:p>
+                    <a:p>
+                      <a:pPr marL="285750" marR="0" lvl="0" indent="-285750" algn="l" defTabSz="914400" rtl="0" eaLnBrk="1" fontAlgn="auto" latinLnBrk="0" hangingPunct="1">
+                        <a:lnSpc>
+                          <a:spcPct val="100000"/>
+                        </a:lnSpc>
+                        <a:spcBef>
+                          <a:spcPts val="0"/>
+                        </a:spcBef>
+                        <a:spcAft>
+                          <a:spcPts val="0"/>
+                        </a:spcAft>
+                        <a:buClrTx/>
+                        <a:buSzTx/>
+                        <a:buFont typeface="Arial" panose="020B0604020202020204" pitchFamily="34" charset="0"/>
+                        <a:buChar char="•"/>
+                        <a:tabLst/>
+                        <a:defRPr/>
+                      </a:pPr>
+                      <a:r>
+                        <a:rPr lang="en-US" sz="1600" dirty="0"/>
+                        <a:t>Multiple files and headers</a:t>
+                      </a:r>
+                    </a:p>
+                    <a:p>
+                      <a:pPr marL="285750" marR="0" lvl="0" indent="-285750" algn="l" defTabSz="914400" rtl="0" eaLnBrk="1" fontAlgn="auto" latinLnBrk="0" hangingPunct="1">
+                        <a:lnSpc>
+                          <a:spcPct val="100000"/>
+                        </a:lnSpc>
+                        <a:spcBef>
+                          <a:spcPts val="0"/>
+                        </a:spcBef>
+                        <a:spcAft>
+                          <a:spcPts val="0"/>
+                        </a:spcAft>
+                        <a:buClrTx/>
+                        <a:buSzTx/>
+                        <a:buFont typeface="Arial" panose="020B0604020202020204" pitchFamily="34" charset="0"/>
+                        <a:buChar char="•"/>
+                        <a:tabLst/>
+                        <a:defRPr/>
+                      </a:pPr>
+                      <a:r>
+                        <a:rPr lang="en-US" sz="1600" dirty="0"/>
+                        <a:t>Classes and Structs</a:t>
+                      </a:r>
+                    </a:p>
+                    <a:p>
+                      <a:pPr marL="285750" lvl="0" indent="-285750">
+                        <a:buFont typeface="Arial" panose="020B0604020202020204" pitchFamily="34" charset="0"/>
+                        <a:buChar char="•"/>
+                      </a:pPr>
+                      <a:r>
+                        <a:rPr lang="en-US" sz="1600" dirty="0"/>
+                        <a:t>Strings</a:t>
+                      </a:r>
+                    </a:p>
+                    <a:p>
+                      <a:pPr marL="285750" lvl="0" indent="-285750">
+                        <a:buFont typeface="Arial" panose="020B0604020202020204" pitchFamily="34" charset="0"/>
+                        <a:buChar char="•"/>
+                      </a:pPr>
+                      <a:r>
+                        <a:rPr lang="en-US" sz="1600" dirty="0"/>
+                        <a:t>Pointers and references</a:t>
                       </a:r>
                     </a:p>
                     <a:p>
@@ -34912,11 +35101,7 @@
                     <a:p>
                       <a:r>
                         <a:rPr lang="en-US" sz="1500" dirty="0"/>
-                        <a:t>Start basic physics game – CPP </a:t>
-                      </a:r>
-                      <a:r>
-                        <a:rPr lang="en-US" sz="1500"/>
-                        <a:t>in unreal</a:t>
+                        <a:t>Start basic physics game – CPP in unreal</a:t>
                       </a:r>
                       <a:endParaRPr lang="en-IL" sz="1500" dirty="0"/>
                     </a:p>
@@ -34972,18 +35157,51 @@
                     <a:bodyPr/>
                     <a:lstStyle/>
                     <a:p>
+                      <a:pPr marL="0" marR="0" lvl="0" indent="0" algn="l" defTabSz="914400" rtl="0" eaLnBrk="1" fontAlgn="auto" latinLnBrk="0" hangingPunct="1">
+                        <a:lnSpc>
+                          <a:spcPct val="100000"/>
+                        </a:lnSpc>
+                        <a:spcBef>
+                          <a:spcPts val="0"/>
+                        </a:spcBef>
+                        <a:spcAft>
+                          <a:spcPts val="0"/>
+                        </a:spcAft>
+                        <a:buClrTx/>
+                        <a:buSzTx/>
+                        <a:buFontTx/>
+                        <a:buNone/>
+                        <a:tabLst/>
+                        <a:defRPr/>
+                      </a:pPr>
                       <a:r>
                         <a:rPr lang="en-US" sz="1500" dirty="0"/>
-                        <a:t>CPP Intermediate: Casting functions, inheritance and polymorphism</a:t>
+                        <a:t>CPP basic: Typedefs and aliasing, std::vector,</a:t>
                       </a:r>
-                    </a:p>
-                    <a:p>
+                      <a:r>
+                        <a:rPr lang="en-US" sz="1600" dirty="0"/>
+                        <a:t> Macros and </a:t>
+                      </a:r>
+                      <a:r>
+                        <a:rPr lang="en-US" sz="1600"/>
+                        <a:t>Preprocessor commands</a:t>
+                      </a:r>
+                      <a:r>
+                        <a:rPr lang="en-US" sz="1500"/>
+                        <a:t> </a:t>
+                      </a:r>
                       <a:endParaRPr lang="en-US" sz="1500" dirty="0"/>
                     </a:p>
                     <a:p>
                       <a:r>
                         <a:rPr lang="en-US" sz="1500" dirty="0"/>
-                        <a:t>Finish Physics based game</a:t>
+                        <a:t>,Casting functions</a:t>
+                      </a:r>
+                    </a:p>
+                    <a:p>
+                      <a:r>
+                        <a:rPr lang="en-US" sz="1500" dirty="0"/>
+                        <a:t>UE5: Finish Physics based game</a:t>
                       </a:r>
                       <a:endParaRPr lang="en-IL" sz="1500" dirty="0"/>
                     </a:p>
@@ -35098,14 +35316,14 @@
             <p:ph idx="1"/>
             <p:extLst>
               <p:ext uri="{D42A27DB-BD31-4B8C-83A1-F6EECF244321}">
-                <p14:modId xmlns:p14="http://schemas.microsoft.com/office/powerpoint/2010/main" val="3261782528"/>
+                <p14:modId xmlns:p14="http://schemas.microsoft.com/office/powerpoint/2010/main" val="400517858"/>
               </p:ext>
             </p:extLst>
           </p:nvPr>
         </p:nvGraphicFramePr>
         <p:xfrm>
           <a:off x="1261484" y="1975655"/>
-          <a:ext cx="9355716" cy="2971705"/>
+          <a:ext cx="9355716" cy="3428905"/>
         </p:xfrm>
         <a:graphic>
           <a:graphicData uri="http://schemas.openxmlformats.org/drawingml/2006/table">
@@ -35213,8 +35431,14 @@
                     <a:p>
                       <a:r>
                         <a:rPr lang="en-US" sz="1500" dirty="0"/>
-                        <a:t>Templates to ranged for loops</a:t>
+                        <a:t>Templates to ranged for loops, inheritance and polymorphism</a:t>
                       </a:r>
+                    </a:p>
+                    <a:p>
+                      <a:endParaRPr lang="en-US" sz="1500" dirty="0"/>
+                    </a:p>
+                    <a:p>
+                      <a:endParaRPr lang="en-US" sz="1500" dirty="0"/>
                     </a:p>
                     <a:p>
                       <a:endParaRPr lang="en-US" sz="1500" dirty="0"/>
@@ -36834,7 +37058,7 @@
             <p:ph idx="1"/>
             <p:extLst>
               <p:ext uri="{D42A27DB-BD31-4B8C-83A1-F6EECF244321}">
-                <p14:modId xmlns:p14="http://schemas.microsoft.com/office/powerpoint/2010/main" val="1094573603"/>
+                <p14:modId xmlns:p14="http://schemas.microsoft.com/office/powerpoint/2010/main" val="3751267219"/>
               </p:ext>
             </p:extLst>
           </p:nvPr>

</xml_diff>

<commit_message>
added materials for class 11
</commit_message>
<xml_diff>
--- a/Classes/Class_1/Course_Syllabus.pptx
+++ b/Classes/Class_1/Course_Syllabus.pptx
@@ -28272,7 +28272,7 @@
           <a:p>
             <a:fld id="{DB430043-EE85-4B6C-A802-3E6B16F216A2}" type="datetimeFigureOut">
               <a:rPr lang="en-IL" smtClean="0"/>
-              <a:t>13/11/2022</a:t>
+              <a:t>09/01/2023</a:t>
             </a:fld>
             <a:endParaRPr lang="en-IL"/>
           </a:p>
@@ -28537,7 +28537,7 @@
           <a:p>
             <a:fld id="{6B548E75-1D94-41E4-8CAC-9631837BFE23}" type="datetimeFigureOut">
               <a:rPr lang="en-IL" smtClean="0"/>
-              <a:t>13/11/2022</a:t>
+              <a:t>09/01/2023</a:t>
             </a:fld>
             <a:endParaRPr lang="en-IL"/>
           </a:p>
@@ -28804,7 +28804,7 @@
           <a:p>
             <a:fld id="{6B548E75-1D94-41E4-8CAC-9631837BFE23}" type="datetimeFigureOut">
               <a:rPr lang="en-IL" smtClean="0"/>
-              <a:t>13/11/2022</a:t>
+              <a:t>09/01/2023</a:t>
             </a:fld>
             <a:endParaRPr lang="en-IL"/>
           </a:p>
@@ -29035,7 +29035,7 @@
           <a:p>
             <a:fld id="{6B548E75-1D94-41E4-8CAC-9631837BFE23}" type="datetimeFigureOut">
               <a:rPr lang="en-IL" smtClean="0"/>
-              <a:t>13/11/2022</a:t>
+              <a:t>09/01/2023</a:t>
             </a:fld>
             <a:endParaRPr lang="en-IL"/>
           </a:p>
@@ -29345,7 +29345,7 @@
           <a:p>
             <a:fld id="{6B548E75-1D94-41E4-8CAC-9631837BFE23}" type="datetimeFigureOut">
               <a:rPr lang="en-IL" smtClean="0"/>
-              <a:t>13/11/2022</a:t>
+              <a:t>09/01/2023</a:t>
             </a:fld>
             <a:endParaRPr lang="en-IL"/>
           </a:p>
@@ -29818,7 +29818,7 @@
           <a:p>
             <a:fld id="{6B548E75-1D94-41E4-8CAC-9631837BFE23}" type="datetimeFigureOut">
               <a:rPr lang="en-IL" smtClean="0"/>
-              <a:t>13/11/2022</a:t>
+              <a:t>09/01/2023</a:t>
             </a:fld>
             <a:endParaRPr lang="en-IL"/>
           </a:p>
@@ -30365,7 +30365,7 @@
           <a:p>
             <a:fld id="{6B548E75-1D94-41E4-8CAC-9631837BFE23}" type="datetimeFigureOut">
               <a:rPr lang="en-IL" smtClean="0"/>
-              <a:t>13/11/2022</a:t>
+              <a:t>09/01/2023</a:t>
             </a:fld>
             <a:endParaRPr lang="en-IL"/>
           </a:p>
@@ -31139,7 +31139,7 @@
           <a:p>
             <a:fld id="{6B548E75-1D94-41E4-8CAC-9631837BFE23}" type="datetimeFigureOut">
               <a:rPr lang="en-IL" smtClean="0"/>
-              <a:t>13/11/2022</a:t>
+              <a:t>09/01/2023</a:t>
             </a:fld>
             <a:endParaRPr lang="en-IL"/>
           </a:p>
@@ -31314,7 +31314,7 @@
           <a:p>
             <a:fld id="{6B548E75-1D94-41E4-8CAC-9631837BFE23}" type="datetimeFigureOut">
               <a:rPr lang="en-IL" smtClean="0"/>
-              <a:t>13/11/2022</a:t>
+              <a:t>09/01/2023</a:t>
             </a:fld>
             <a:endParaRPr lang="en-IL"/>
           </a:p>
@@ -31537,7 +31537,7 @@
           <a:p>
             <a:fld id="{6B548E75-1D94-41E4-8CAC-9631837BFE23}" type="datetimeFigureOut">
               <a:rPr lang="en-IL" smtClean="0"/>
-              <a:t>13/11/2022</a:t>
+              <a:t>09/01/2023</a:t>
             </a:fld>
             <a:endParaRPr lang="en-IL"/>
           </a:p>
@@ -31717,7 +31717,7 @@
           <a:p>
             <a:fld id="{6B548E75-1D94-41E4-8CAC-9631837BFE23}" type="datetimeFigureOut">
               <a:rPr lang="en-IL" smtClean="0"/>
-              <a:t>13/11/2022</a:t>
+              <a:t>09/01/2023</a:t>
             </a:fld>
             <a:endParaRPr lang="en-IL"/>
           </a:p>
@@ -32006,7 +32006,7 @@
           <a:p>
             <a:fld id="{6B548E75-1D94-41E4-8CAC-9631837BFE23}" type="datetimeFigureOut">
               <a:rPr lang="en-IL" smtClean="0"/>
-              <a:t>13/11/2022</a:t>
+              <a:t>09/01/2023</a:t>
             </a:fld>
             <a:endParaRPr lang="en-IL"/>
           </a:p>
@@ -32248,7 +32248,7 @@
           <a:p>
             <a:fld id="{6B548E75-1D94-41E4-8CAC-9631837BFE23}" type="datetimeFigureOut">
               <a:rPr lang="en-IL" smtClean="0"/>
-              <a:t>13/11/2022</a:t>
+              <a:t>09/01/2023</a:t>
             </a:fld>
             <a:endParaRPr lang="en-IL"/>
           </a:p>
@@ -32627,7 +32627,7 @@
           <a:p>
             <a:fld id="{6B548E75-1D94-41E4-8CAC-9631837BFE23}" type="datetimeFigureOut">
               <a:rPr lang="en-IL" smtClean="0"/>
-              <a:t>13/11/2022</a:t>
+              <a:t>09/01/2023</a:t>
             </a:fld>
             <a:endParaRPr lang="en-IL"/>
           </a:p>
@@ -32745,7 +32745,7 @@
           <a:p>
             <a:fld id="{6B548E75-1D94-41E4-8CAC-9631837BFE23}" type="datetimeFigureOut">
               <a:rPr lang="en-IL" smtClean="0"/>
-              <a:t>13/11/2022</a:t>
+              <a:t>09/01/2023</a:t>
             </a:fld>
             <a:endParaRPr lang="en-IL"/>
           </a:p>
@@ -32840,7 +32840,7 @@
           <a:p>
             <a:fld id="{6B548E75-1D94-41E4-8CAC-9631837BFE23}" type="datetimeFigureOut">
               <a:rPr lang="en-IL" smtClean="0"/>
-              <a:t>13/11/2022</a:t>
+              <a:t>09/01/2023</a:t>
             </a:fld>
             <a:endParaRPr lang="en-IL"/>
           </a:p>
@@ -33089,7 +33089,7 @@
           <a:p>
             <a:fld id="{6B548E75-1D94-41E4-8CAC-9631837BFE23}" type="datetimeFigureOut">
               <a:rPr lang="en-IL" smtClean="0"/>
-              <a:t>13/11/2022</a:t>
+              <a:t>09/01/2023</a:t>
             </a:fld>
             <a:endParaRPr lang="en-IL"/>
           </a:p>
@@ -33346,7 +33346,7 @@
           <a:p>
             <a:fld id="{6B548E75-1D94-41E4-8CAC-9631837BFE23}" type="datetimeFigureOut">
               <a:rPr lang="en-IL" smtClean="0"/>
-              <a:t>13/11/2022</a:t>
+              <a:t>09/01/2023</a:t>
             </a:fld>
             <a:endParaRPr lang="en-IL"/>
           </a:p>
@@ -33608,7 +33608,7 @@
           <a:p>
             <a:fld id="{6B548E75-1D94-41E4-8CAC-9631837BFE23}" type="datetimeFigureOut">
               <a:rPr lang="en-IL" smtClean="0"/>
-              <a:t>13/11/2022</a:t>
+              <a:t>09/01/2023</a:t>
             </a:fld>
             <a:endParaRPr lang="en-IL"/>
           </a:p>
@@ -36328,7 +36328,7 @@
             <p:ph idx="1"/>
             <p:extLst>
               <p:ext uri="{D42A27DB-BD31-4B8C-83A1-F6EECF244321}">
-                <p14:modId xmlns:p14="http://schemas.microsoft.com/office/powerpoint/2010/main" val="1866586846"/>
+                <p14:modId xmlns:p14="http://schemas.microsoft.com/office/powerpoint/2010/main" val="823571405"/>
               </p:ext>
             </p:extLst>
           </p:nvPr>
@@ -36659,7 +36659,15 @@
                     <a:p>
                       <a:r>
                         <a:rPr lang="en-US" sz="1500" dirty="0"/>
-                        <a:t>Final Project submission</a:t>
+                        <a:t>After </a:t>
+                      </a:r>
+                      <a:r>
+                        <a:rPr lang="en-US" sz="1500"/>
+                        <a:t>3 weeks - Final </a:t>
+                      </a:r>
+                      <a:r>
+                        <a:rPr lang="en-US" sz="1500" dirty="0"/>
+                        <a:t>Project submission</a:t>
                       </a:r>
                       <a:endParaRPr lang="en-IL" sz="1500" dirty="0"/>
                     </a:p>

</xml_diff>